<commit_message>
add lyrics EDA - delete one genre eda slide
</commit_message>
<xml_diff>
--- a/Presentations/Spotify NLP status 20231005.pptx
+++ b/Presentations/Spotify NLP status 20231005.pptx
@@ -5,19 +5,20 @@
     <p:sldMasterId id="2147483648" r:id="rId1"/>
   </p:sldMasterIdLst>
   <p:notesMasterIdLst>
-    <p:notesMasterId r:id="rId12"/>
+    <p:notesMasterId r:id="rId13"/>
   </p:notesMasterIdLst>
   <p:sldIdLst>
     <p:sldId id="256" r:id="rId2"/>
     <p:sldId id="301" r:id="rId3"/>
     <p:sldId id="299" r:id="rId4"/>
     <p:sldId id="302" r:id="rId5"/>
-    <p:sldId id="303" r:id="rId6"/>
-    <p:sldId id="304" r:id="rId7"/>
-    <p:sldId id="305" r:id="rId8"/>
-    <p:sldId id="298" r:id="rId9"/>
-    <p:sldId id="300" r:id="rId10"/>
-    <p:sldId id="266" r:id="rId11"/>
+    <p:sldId id="304" r:id="rId6"/>
+    <p:sldId id="305" r:id="rId7"/>
+    <p:sldId id="298" r:id="rId8"/>
+    <p:sldId id="300" r:id="rId9"/>
+    <p:sldId id="306" r:id="rId10"/>
+    <p:sldId id="307" r:id="rId11"/>
+    <p:sldId id="266" r:id="rId12"/>
   </p:sldIdLst>
   <p:sldSz cx="12192000" cy="6858000"/>
   <p:notesSz cx="6858000" cy="9144000"/>
@@ -214,7 +215,7 @@
           <a:p>
             <a:fld id="{A1DE6012-1BD2-423A-B783-8C352B9F1F3A}" type="datetimeFigureOut">
               <a:rPr lang="en-US" smtClean="0"/>
-              <a:t>10/4/23</a:t>
+              <a:t>10/5/23</a:t>
             </a:fld>
             <a:endParaRPr lang="en-US"/>
           </a:p>
@@ -565,6 +566,90 @@
 </p:notes>
 </file>
 
+<file path=ppt/notesSlides/notesSlide10.xml><?xml version="1.0" encoding="utf-8"?>
+<p:notes xmlns:a="http://schemas.openxmlformats.org/drawingml/2006/main" xmlns:r="http://schemas.openxmlformats.org/officeDocument/2006/relationships" xmlns:p="http://schemas.openxmlformats.org/presentationml/2006/main">
+  <p:cSld>
+    <p:spTree>
+      <p:nvGrpSpPr>
+        <p:cNvPr id="1" name=""/>
+        <p:cNvGrpSpPr/>
+        <p:nvPr/>
+      </p:nvGrpSpPr>
+      <p:grpSpPr>
+        <a:xfrm>
+          <a:off x="0" y="0"/>
+          <a:ext cx="0" cy="0"/>
+          <a:chOff x="0" y="0"/>
+          <a:chExt cx="0" cy="0"/>
+        </a:xfrm>
+      </p:grpSpPr>
+      <p:sp>
+        <p:nvSpPr>
+          <p:cNvPr id="2" name="Slide Image Placeholder 1"/>
+          <p:cNvSpPr>
+            <a:spLocks noGrp="1" noRot="1" noChangeAspect="1"/>
+          </p:cNvSpPr>
+          <p:nvPr>
+            <p:ph type="sldImg"/>
+          </p:nvPr>
+        </p:nvSpPr>
+        <p:spPr/>
+      </p:sp>
+      <p:sp>
+        <p:nvSpPr>
+          <p:cNvPr id="3" name="Notes Placeholder 2"/>
+          <p:cNvSpPr>
+            <a:spLocks noGrp="1"/>
+          </p:cNvSpPr>
+          <p:nvPr>
+            <p:ph type="body" idx="1"/>
+          </p:nvPr>
+        </p:nvSpPr>
+        <p:spPr/>
+        <p:txBody>
+          <a:bodyPr/>
+          <a:lstStyle/>
+          <a:p>
+            <a:endParaRPr lang="en-US" dirty="0"/>
+          </a:p>
+        </p:txBody>
+      </p:sp>
+      <p:sp>
+        <p:nvSpPr>
+          <p:cNvPr id="4" name="Slide Number Placeholder 3"/>
+          <p:cNvSpPr>
+            <a:spLocks noGrp="1"/>
+          </p:cNvSpPr>
+          <p:nvPr>
+            <p:ph type="sldNum" sz="quarter" idx="5"/>
+          </p:nvPr>
+        </p:nvSpPr>
+        <p:spPr/>
+        <p:txBody>
+          <a:bodyPr/>
+          <a:lstStyle/>
+          <a:p>
+            <a:fld id="{7CEDCF92-708B-42BD-8680-DB4A1F579832}" type="slidenum">
+              <a:rPr lang="en-US" smtClean="0"/>
+              <a:t>10</a:t>
+            </a:fld>
+            <a:endParaRPr lang="en-US"/>
+          </a:p>
+        </p:txBody>
+      </p:sp>
+    </p:spTree>
+    <p:extLst>
+      <p:ext uri="{BB962C8B-B14F-4D97-AF65-F5344CB8AC3E}">
+        <p14:creationId xmlns:p14="http://schemas.microsoft.com/office/powerpoint/2010/main" val="4261963777"/>
+      </p:ext>
+    </p:extLst>
+  </p:cSld>
+  <p:clrMapOvr>
+    <a:masterClrMapping/>
+  </p:clrMapOvr>
+</p:notes>
+</file>
+
 <file path=ppt/notesSlides/notesSlide2.xml><?xml version="1.0" encoding="utf-8"?>
 <p:notes xmlns:a="http://schemas.openxmlformats.org/drawingml/2006/main" xmlns:r="http://schemas.openxmlformats.org/officeDocument/2006/relationships" xmlns:p="http://schemas.openxmlformats.org/presentationml/2006/main">
   <p:cSld>
@@ -891,7 +976,7 @@
     </p:spTree>
     <p:extLst>
       <p:ext uri="{BB962C8B-B14F-4D97-AF65-F5344CB8AC3E}">
-        <p14:creationId xmlns:p14="http://schemas.microsoft.com/office/powerpoint/2010/main" val="2341035629"/>
+        <p14:creationId xmlns:p14="http://schemas.microsoft.com/office/powerpoint/2010/main" val="2653157693"/>
       </p:ext>
     </p:extLst>
   </p:cSld>
@@ -975,7 +1060,7 @@
     </p:spTree>
     <p:extLst>
       <p:ext uri="{BB962C8B-B14F-4D97-AF65-F5344CB8AC3E}">
-        <p14:creationId xmlns:p14="http://schemas.microsoft.com/office/powerpoint/2010/main" val="2653157693"/>
+        <p14:creationId xmlns:p14="http://schemas.microsoft.com/office/powerpoint/2010/main" val="3758975559"/>
       </p:ext>
     </p:extLst>
   </p:cSld>
@@ -1059,7 +1144,7 @@
     </p:spTree>
     <p:extLst>
       <p:ext uri="{BB962C8B-B14F-4D97-AF65-F5344CB8AC3E}">
-        <p14:creationId xmlns:p14="http://schemas.microsoft.com/office/powerpoint/2010/main" val="3758975559"/>
+        <p14:creationId xmlns:p14="http://schemas.microsoft.com/office/powerpoint/2010/main" val="689758974"/>
       </p:ext>
     </p:extLst>
   </p:cSld>
@@ -1143,7 +1228,7 @@
     </p:spTree>
     <p:extLst>
       <p:ext uri="{BB962C8B-B14F-4D97-AF65-F5344CB8AC3E}">
-        <p14:creationId xmlns:p14="http://schemas.microsoft.com/office/powerpoint/2010/main" val="689758974"/>
+        <p14:creationId xmlns:p14="http://schemas.microsoft.com/office/powerpoint/2010/main" val="2198979677"/>
       </p:ext>
     </p:extLst>
   </p:cSld>
@@ -1227,7 +1312,7 @@
     </p:spTree>
     <p:extLst>
       <p:ext uri="{BB962C8B-B14F-4D97-AF65-F5344CB8AC3E}">
-        <p14:creationId xmlns:p14="http://schemas.microsoft.com/office/powerpoint/2010/main" val="2198979677"/>
+        <p14:creationId xmlns:p14="http://schemas.microsoft.com/office/powerpoint/2010/main" val="1276230556"/>
       </p:ext>
     </p:extLst>
   </p:cSld>
@@ -1384,7 +1469,7 @@
           <a:p>
             <a:fld id="{C085A3C5-C84E-4FAD-9AAC-6508D1A5CE25}" type="datetimeFigureOut">
               <a:rPr lang="en-US" smtClean="0"/>
-              <a:t>10/4/23</a:t>
+              <a:t>10/5/23</a:t>
             </a:fld>
             <a:endParaRPr lang="en-US"/>
           </a:p>
@@ -1582,7 +1667,7 @@
           <a:p>
             <a:fld id="{C085A3C5-C84E-4FAD-9AAC-6508D1A5CE25}" type="datetimeFigureOut">
               <a:rPr lang="en-US" smtClean="0"/>
-              <a:t>10/4/23</a:t>
+              <a:t>10/5/23</a:t>
             </a:fld>
             <a:endParaRPr lang="en-US"/>
           </a:p>
@@ -1790,7 +1875,7 @@
           <a:p>
             <a:fld id="{C085A3C5-C84E-4FAD-9AAC-6508D1A5CE25}" type="datetimeFigureOut">
               <a:rPr lang="en-US" smtClean="0"/>
-              <a:t>10/4/23</a:t>
+              <a:t>10/5/23</a:t>
             </a:fld>
             <a:endParaRPr lang="en-US"/>
           </a:p>
@@ -1988,7 +2073,7 @@
           <a:p>
             <a:fld id="{C085A3C5-C84E-4FAD-9AAC-6508D1A5CE25}" type="datetimeFigureOut">
               <a:rPr lang="en-US" smtClean="0"/>
-              <a:t>10/4/23</a:t>
+              <a:t>10/5/23</a:t>
             </a:fld>
             <a:endParaRPr lang="en-US"/>
           </a:p>
@@ -2263,7 +2348,7 @@
           <a:p>
             <a:fld id="{C085A3C5-C84E-4FAD-9AAC-6508D1A5CE25}" type="datetimeFigureOut">
               <a:rPr lang="en-US" smtClean="0"/>
-              <a:t>10/4/23</a:t>
+              <a:t>10/5/23</a:t>
             </a:fld>
             <a:endParaRPr lang="en-US"/>
           </a:p>
@@ -2528,7 +2613,7 @@
           <a:p>
             <a:fld id="{C085A3C5-C84E-4FAD-9AAC-6508D1A5CE25}" type="datetimeFigureOut">
               <a:rPr lang="en-US" smtClean="0"/>
-              <a:t>10/4/23</a:t>
+              <a:t>10/5/23</a:t>
             </a:fld>
             <a:endParaRPr lang="en-US"/>
           </a:p>
@@ -2940,7 +3025,7 @@
           <a:p>
             <a:fld id="{C085A3C5-C84E-4FAD-9AAC-6508D1A5CE25}" type="datetimeFigureOut">
               <a:rPr lang="en-US" smtClean="0"/>
-              <a:t>10/4/23</a:t>
+              <a:t>10/5/23</a:t>
             </a:fld>
             <a:endParaRPr lang="en-US"/>
           </a:p>
@@ -3081,7 +3166,7 @@
           <a:p>
             <a:fld id="{C085A3C5-C84E-4FAD-9AAC-6508D1A5CE25}" type="datetimeFigureOut">
               <a:rPr lang="en-US" smtClean="0"/>
-              <a:t>10/4/23</a:t>
+              <a:t>10/5/23</a:t>
             </a:fld>
             <a:endParaRPr lang="en-US"/>
           </a:p>
@@ -3434,7 +3519,7 @@
           <a:p>
             <a:fld id="{C085A3C5-C84E-4FAD-9AAC-6508D1A5CE25}" type="datetimeFigureOut">
               <a:rPr lang="en-US" smtClean="0"/>
-              <a:t>10/4/23</a:t>
+              <a:t>10/5/23</a:t>
             </a:fld>
             <a:endParaRPr lang="en-US"/>
           </a:p>
@@ -3745,7 +3830,7 @@
           <a:p>
             <a:fld id="{C085A3C5-C84E-4FAD-9AAC-6508D1A5CE25}" type="datetimeFigureOut">
               <a:rPr lang="en-US" smtClean="0"/>
-              <a:t>10/4/23</a:t>
+              <a:t>10/5/23</a:t>
             </a:fld>
             <a:endParaRPr lang="en-US"/>
           </a:p>
@@ -4033,7 +4118,7 @@
           <a:p>
             <a:fld id="{C085A3C5-C84E-4FAD-9AAC-6508D1A5CE25}" type="datetimeFigureOut">
               <a:rPr lang="en-US" smtClean="0"/>
-              <a:t>10/4/23</a:t>
+              <a:t>10/5/23</a:t>
             </a:fld>
             <a:endParaRPr lang="en-US"/>
           </a:p>
@@ -4280,7 +4365,7 @@
           <a:p>
             <a:fld id="{C085A3C5-C84E-4FAD-9AAC-6508D1A5CE25}" type="datetimeFigureOut">
               <a:rPr lang="en-US" smtClean="0"/>
-              <a:t>10/4/23</a:t>
+              <a:t>10/5/23</a:t>
             </a:fld>
             <a:endParaRPr lang="en-US"/>
           </a:p>
@@ -5432,6 +5517,1083 @@
 <file path=ppt/slides/slide10.xml><?xml version="1.0" encoding="utf-8"?>
 <p:sld xmlns:a="http://schemas.openxmlformats.org/drawingml/2006/main" xmlns:r="http://schemas.openxmlformats.org/officeDocument/2006/relationships" xmlns:p="http://schemas.openxmlformats.org/presentationml/2006/main">
   <p:cSld>
+    <p:bg>
+      <p:bgPr>
+        <a:solidFill>
+          <a:srgbClr val="191414"/>
+        </a:solidFill>
+        <a:effectLst/>
+      </p:bgPr>
+    </p:bg>
+    <p:spTree>
+      <p:nvGrpSpPr>
+        <p:cNvPr id="1" name=""/>
+        <p:cNvGrpSpPr/>
+        <p:nvPr/>
+      </p:nvGrpSpPr>
+      <p:grpSpPr>
+        <a:xfrm>
+          <a:off x="0" y="0"/>
+          <a:ext cx="0" cy="0"/>
+          <a:chOff x="0" y="0"/>
+          <a:chExt cx="0" cy="0"/>
+        </a:xfrm>
+      </p:grpSpPr>
+      <p:sp>
+        <p:nvSpPr>
+          <p:cNvPr id="18" name="TextBox 17">
+            <a:extLst>
+              <a:ext uri="{FF2B5EF4-FFF2-40B4-BE49-F238E27FC236}">
+                <a16:creationId xmlns:a16="http://schemas.microsoft.com/office/drawing/2014/main" id="{355AC3A1-175C-0DC3-DBAF-F626A9F3780A}"/>
+              </a:ext>
+            </a:extLst>
+          </p:cNvPr>
+          <p:cNvSpPr txBox="1"/>
+          <p:nvPr/>
+        </p:nvSpPr>
+        <p:spPr>
+          <a:xfrm>
+            <a:off x="3474402" y="388280"/>
+            <a:ext cx="7841298" cy="769441"/>
+          </a:xfrm>
+          <a:prstGeom prst="rect">
+            <a:avLst/>
+          </a:prstGeom>
+          <a:noFill/>
+        </p:spPr>
+        <p:txBody>
+          <a:bodyPr wrap="square" rtlCol="0">
+            <a:spAutoFit/>
+          </a:bodyPr>
+          <a:lstStyle/>
+          <a:p>
+            <a:r>
+              <a:rPr lang="en-US" sz="4400" b="1" dirty="0">
+                <a:solidFill>
+                  <a:srgbClr val="1DB954"/>
+                </a:solidFill>
+                <a:latin typeface="Segoe UI" panose="020B0502040204020203" pitchFamily="34" charset="0"/>
+                <a:cs typeface="Segoe UI" panose="020B0502040204020203" pitchFamily="34" charset="0"/>
+              </a:rPr>
+              <a:t>EDA</a:t>
+            </a:r>
+            <a:endParaRPr lang="en-US" sz="4400" b="1" dirty="0">
+              <a:solidFill>
+                <a:schemeClr val="bg1"/>
+              </a:solidFill>
+              <a:latin typeface="Segoe UI" panose="020B0502040204020203" pitchFamily="34" charset="0"/>
+              <a:cs typeface="Segoe UI" panose="020B0502040204020203" pitchFamily="34" charset="0"/>
+            </a:endParaRPr>
+          </a:p>
+        </p:txBody>
+      </p:sp>
+      <p:sp>
+        <p:nvSpPr>
+          <p:cNvPr id="45" name="TextBox 44">
+            <a:extLst>
+              <a:ext uri="{FF2B5EF4-FFF2-40B4-BE49-F238E27FC236}">
+                <a16:creationId xmlns:a16="http://schemas.microsoft.com/office/drawing/2014/main" id="{B6429CB9-9544-2C8E-5FE0-1DF020713FDA}"/>
+              </a:ext>
+            </a:extLst>
+          </p:cNvPr>
+          <p:cNvSpPr txBox="1"/>
+          <p:nvPr/>
+        </p:nvSpPr>
+        <p:spPr>
+          <a:xfrm>
+            <a:off x="3678542" y="1492875"/>
+            <a:ext cx="3960000" cy="366917"/>
+          </a:xfrm>
+          <a:prstGeom prst="rect">
+            <a:avLst/>
+          </a:prstGeom>
+          <a:noFill/>
+        </p:spPr>
+        <p:txBody>
+          <a:bodyPr wrap="none" lIns="0" rIns="0" rtlCol="0" anchor="ctr">
+            <a:noAutofit/>
+          </a:bodyPr>
+          <a:lstStyle/>
+          <a:p>
+            <a:endParaRPr lang="en-US" sz="1400" dirty="0">
+              <a:solidFill>
+                <a:schemeClr val="bg1"/>
+              </a:solidFill>
+              <a:latin typeface="Segoe UI" panose="020B0502040204020203" pitchFamily="34" charset="0"/>
+              <a:cs typeface="Segoe UI" panose="020B0502040204020203" pitchFamily="34" charset="0"/>
+            </a:endParaRPr>
+          </a:p>
+        </p:txBody>
+      </p:sp>
+      <p:sp>
+        <p:nvSpPr>
+          <p:cNvPr id="3" name="TextBox 20">
+            <a:extLst>
+              <a:ext uri="{FF2B5EF4-FFF2-40B4-BE49-F238E27FC236}">
+                <a16:creationId xmlns:a16="http://schemas.microsoft.com/office/drawing/2014/main" id="{120F99AC-1455-3A16-6F33-5B71AA5C26C8}"/>
+              </a:ext>
+            </a:extLst>
+          </p:cNvPr>
+          <p:cNvSpPr txBox="1"/>
+          <p:nvPr/>
+        </p:nvSpPr>
+        <p:spPr>
+          <a:xfrm>
+            <a:off x="380682" y="1843961"/>
+            <a:ext cx="2296800" cy="366917"/>
+          </a:xfrm>
+          <a:prstGeom prst="roundRect">
+            <a:avLst/>
+          </a:prstGeom>
+          <a:gradFill>
+            <a:gsLst>
+              <a:gs pos="0">
+                <a:schemeClr val="bg1">
+                  <a:lumMod val="50000"/>
+                  <a:alpha val="45000"/>
+                </a:schemeClr>
+              </a:gs>
+              <a:gs pos="100000">
+                <a:srgbClr val="191414">
+                  <a:alpha val="25000"/>
+                </a:srgbClr>
+              </a:gs>
+            </a:gsLst>
+            <a:lin ang="4200000" scaled="0"/>
+          </a:gradFill>
+        </p:spPr>
+        <p:txBody>
+          <a:bodyPr wrap="none" lIns="684000" rtlCol="0" anchor="ctr">
+            <a:noAutofit/>
+          </a:bodyPr>
+          <a:lstStyle/>
+          <a:p>
+            <a:r>
+              <a:rPr lang="en-US" sz="1400" b="1" dirty="0">
+                <a:solidFill>
+                  <a:schemeClr val="bg1"/>
+                </a:solidFill>
+                <a:latin typeface="Segoe UI" panose="020B0502040204020203" pitchFamily="34" charset="0"/>
+                <a:cs typeface="Segoe UI" panose="020B0502040204020203" pitchFamily="34" charset="0"/>
+              </a:rPr>
+              <a:t>EDA</a:t>
+            </a:r>
+          </a:p>
+        </p:txBody>
+      </p:sp>
+      <p:sp>
+        <p:nvSpPr>
+          <p:cNvPr id="10" name="TextBox 21">
+            <a:extLst>
+              <a:ext uri="{FF2B5EF4-FFF2-40B4-BE49-F238E27FC236}">
+                <a16:creationId xmlns:a16="http://schemas.microsoft.com/office/drawing/2014/main" id="{228298A3-AA79-9AAE-DC10-145B5C02E7BD}"/>
+              </a:ext>
+            </a:extLst>
+          </p:cNvPr>
+          <p:cNvSpPr txBox="1"/>
+          <p:nvPr/>
+        </p:nvSpPr>
+        <p:spPr>
+          <a:xfrm>
+            <a:off x="383220" y="1296806"/>
+            <a:ext cx="2296800" cy="366917"/>
+          </a:xfrm>
+          <a:prstGeom prst="roundRect">
+            <a:avLst/>
+          </a:prstGeom>
+          <a:noFill/>
+        </p:spPr>
+        <p:txBody>
+          <a:bodyPr wrap="none" lIns="684000" rtlCol="0" anchor="ctr">
+            <a:noAutofit/>
+          </a:bodyPr>
+          <a:lstStyle/>
+          <a:p>
+            <a:r>
+              <a:rPr lang="en-US" sz="1400" dirty="0">
+                <a:solidFill>
+                  <a:schemeClr val="bg1"/>
+                </a:solidFill>
+                <a:latin typeface="Segoe UI" panose="020B0502040204020203" pitchFamily="34" charset="0"/>
+                <a:cs typeface="Segoe UI" panose="020B0502040204020203" pitchFamily="34" charset="0"/>
+              </a:rPr>
+              <a:t>Preprocessing Steps</a:t>
+            </a:r>
+          </a:p>
+        </p:txBody>
+      </p:sp>
+      <p:grpSp>
+        <p:nvGrpSpPr>
+          <p:cNvPr id="11" name="Group 1035">
+            <a:extLst>
+              <a:ext uri="{FF2B5EF4-FFF2-40B4-BE49-F238E27FC236}">
+                <a16:creationId xmlns:a16="http://schemas.microsoft.com/office/drawing/2014/main" id="{744F1910-5910-7A90-49C6-531CB5AFEF2A}"/>
+              </a:ext>
+            </a:extLst>
+          </p:cNvPr>
+          <p:cNvGrpSpPr/>
+          <p:nvPr/>
+        </p:nvGrpSpPr>
+        <p:grpSpPr>
+          <a:xfrm>
+            <a:off x="591710" y="1393732"/>
+            <a:ext cx="258819" cy="225423"/>
+            <a:chOff x="7005638" y="3648076"/>
+            <a:chExt cx="344488" cy="300038"/>
+          </a:xfrm>
+        </p:grpSpPr>
+        <p:sp>
+          <p:nvSpPr>
+            <p:cNvPr id="12" name="Freeform 90">
+              <a:extLst>
+                <a:ext uri="{FF2B5EF4-FFF2-40B4-BE49-F238E27FC236}">
+                  <a16:creationId xmlns:a16="http://schemas.microsoft.com/office/drawing/2014/main" id="{328E40C6-FD5C-DD40-06A4-F1942B4A4FAB}"/>
+                </a:ext>
+              </a:extLst>
+            </p:cNvPr>
+            <p:cNvSpPr>
+              <a:spLocks/>
+            </p:cNvSpPr>
+            <p:nvPr/>
+          </p:nvSpPr>
+          <p:spPr bwMode="auto">
+            <a:xfrm>
+              <a:off x="7005638" y="3648076"/>
+              <a:ext cx="344488" cy="269875"/>
+            </a:xfrm>
+            <a:custGeom>
+              <a:avLst/>
+              <a:gdLst>
+                <a:gd name="T0" fmla="*/ 92 w 92"/>
+                <a:gd name="T1" fmla="*/ 66 h 72"/>
+                <a:gd name="T2" fmla="*/ 86 w 92"/>
+                <a:gd name="T3" fmla="*/ 72 h 72"/>
+                <a:gd name="T4" fmla="*/ 6 w 92"/>
+                <a:gd name="T5" fmla="*/ 72 h 72"/>
+                <a:gd name="T6" fmla="*/ 0 w 92"/>
+                <a:gd name="T7" fmla="*/ 66 h 72"/>
+                <a:gd name="T8" fmla="*/ 0 w 92"/>
+                <a:gd name="T9" fmla="*/ 6 h 72"/>
+                <a:gd name="T10" fmla="*/ 6 w 92"/>
+                <a:gd name="T11" fmla="*/ 0 h 72"/>
+                <a:gd name="T12" fmla="*/ 86 w 92"/>
+                <a:gd name="T13" fmla="*/ 0 h 72"/>
+                <a:gd name="T14" fmla="*/ 92 w 92"/>
+                <a:gd name="T15" fmla="*/ 6 h 72"/>
+                <a:gd name="T16" fmla="*/ 92 w 92"/>
+                <a:gd name="T17" fmla="*/ 66 h 72"/>
+              </a:gdLst>
+              <a:ahLst/>
+              <a:cxnLst>
+                <a:cxn ang="0">
+                  <a:pos x="T0" y="T1"/>
+                </a:cxn>
+                <a:cxn ang="0">
+                  <a:pos x="T2" y="T3"/>
+                </a:cxn>
+                <a:cxn ang="0">
+                  <a:pos x="T4" y="T5"/>
+                </a:cxn>
+                <a:cxn ang="0">
+                  <a:pos x="T6" y="T7"/>
+                </a:cxn>
+                <a:cxn ang="0">
+                  <a:pos x="T8" y="T9"/>
+                </a:cxn>
+                <a:cxn ang="0">
+                  <a:pos x="T10" y="T11"/>
+                </a:cxn>
+                <a:cxn ang="0">
+                  <a:pos x="T12" y="T13"/>
+                </a:cxn>
+                <a:cxn ang="0">
+                  <a:pos x="T14" y="T15"/>
+                </a:cxn>
+                <a:cxn ang="0">
+                  <a:pos x="T16" y="T17"/>
+                </a:cxn>
+              </a:cxnLst>
+              <a:rect l="0" t="0" r="r" b="b"/>
+              <a:pathLst>
+                <a:path w="92" h="72">
+                  <a:moveTo>
+                    <a:pt x="92" y="66"/>
+                  </a:moveTo>
+                  <a:cubicBezTo>
+                    <a:pt x="92" y="69"/>
+                    <a:pt x="89" y="72"/>
+                    <a:pt x="86" y="72"/>
+                  </a:cubicBezTo>
+                  <a:cubicBezTo>
+                    <a:pt x="6" y="72"/>
+                    <a:pt x="6" y="72"/>
+                    <a:pt x="6" y="72"/>
+                  </a:cubicBezTo>
+                  <a:cubicBezTo>
+                    <a:pt x="3" y="72"/>
+                    <a:pt x="0" y="69"/>
+                    <a:pt x="0" y="66"/>
+                  </a:cubicBezTo>
+                  <a:cubicBezTo>
+                    <a:pt x="0" y="6"/>
+                    <a:pt x="0" y="6"/>
+                    <a:pt x="0" y="6"/>
+                  </a:cubicBezTo>
+                  <a:cubicBezTo>
+                    <a:pt x="0" y="3"/>
+                    <a:pt x="3" y="0"/>
+                    <a:pt x="6" y="0"/>
+                  </a:cubicBezTo>
+                  <a:cubicBezTo>
+                    <a:pt x="86" y="0"/>
+                    <a:pt x="86" y="0"/>
+                    <a:pt x="86" y="0"/>
+                  </a:cubicBezTo>
+                  <a:cubicBezTo>
+                    <a:pt x="89" y="0"/>
+                    <a:pt x="92" y="3"/>
+                    <a:pt x="92" y="6"/>
+                  </a:cubicBezTo>
+                  <a:lnTo>
+                    <a:pt x="92" y="66"/>
+                  </a:lnTo>
+                  <a:close/>
+                </a:path>
+              </a:pathLst>
+            </a:custGeom>
+            <a:noFill/>
+            <a:ln w="9525" cap="rnd">
+              <a:solidFill>
+                <a:schemeClr val="bg1"/>
+              </a:solidFill>
+              <a:prstDash val="solid"/>
+              <a:round/>
+              <a:headEnd/>
+              <a:tailEnd/>
+            </a:ln>
+            <a:extLst>
+              <a:ext uri="{909E8E84-426E-40DD-AFC4-6F175D3DCCD1}">
+                <a14:hiddenFill xmlns:a14="http://schemas.microsoft.com/office/drawing/2010/main">
+                  <a:solidFill>
+                    <a:srgbClr val="FFFFFF"/>
+                  </a:solidFill>
+                </a14:hiddenFill>
+              </a:ext>
+            </a:extLst>
+          </p:spPr>
+          <p:txBody>
+            <a:bodyPr vert="horz" wrap="square" lIns="91440" tIns="45720" rIns="91440" bIns="45720" numCol="1" anchor="t" anchorCtr="0" compatLnSpc="1">
+              <a:prstTxWarp prst="textNoShape">
+                <a:avLst/>
+              </a:prstTxWarp>
+            </a:bodyPr>
+            <a:lstStyle/>
+            <a:p>
+              <a:endParaRPr lang="id-ID"/>
+            </a:p>
+          </p:txBody>
+        </p:sp>
+        <p:sp>
+          <p:nvSpPr>
+            <p:cNvPr id="13" name="Line 91">
+              <a:extLst>
+                <a:ext uri="{FF2B5EF4-FFF2-40B4-BE49-F238E27FC236}">
+                  <a16:creationId xmlns:a16="http://schemas.microsoft.com/office/drawing/2014/main" id="{B1DE3B6B-DA0B-27DC-5332-5CDF012300E9}"/>
+                </a:ext>
+              </a:extLst>
+            </p:cNvPr>
+            <p:cNvSpPr>
+              <a:spLocks noChangeShapeType="1"/>
+            </p:cNvSpPr>
+            <p:nvPr/>
+          </p:nvSpPr>
+          <p:spPr bwMode="auto">
+            <a:xfrm>
+              <a:off x="7072313" y="3948113"/>
+              <a:ext cx="211138" cy="0"/>
+            </a:xfrm>
+            <a:prstGeom prst="line">
+              <a:avLst/>
+            </a:prstGeom>
+            <a:noFill/>
+            <a:ln w="9525" cap="rnd">
+              <a:solidFill>
+                <a:schemeClr val="bg1"/>
+              </a:solidFill>
+              <a:prstDash val="solid"/>
+              <a:round/>
+              <a:headEnd/>
+              <a:tailEnd/>
+            </a:ln>
+            <a:extLst>
+              <a:ext uri="{909E8E84-426E-40DD-AFC4-6F175D3DCCD1}">
+                <a14:hiddenFill xmlns:a14="http://schemas.microsoft.com/office/drawing/2010/main">
+                  <a:noFill/>
+                </a14:hiddenFill>
+              </a:ext>
+            </a:extLst>
+          </p:spPr>
+          <p:txBody>
+            <a:bodyPr vert="horz" wrap="square" lIns="91440" tIns="45720" rIns="91440" bIns="45720" numCol="1" anchor="t" anchorCtr="0" compatLnSpc="1">
+              <a:prstTxWarp prst="textNoShape">
+                <a:avLst/>
+              </a:prstTxWarp>
+            </a:bodyPr>
+            <a:lstStyle/>
+            <a:p>
+              <a:endParaRPr lang="id-ID"/>
+            </a:p>
+          </p:txBody>
+        </p:sp>
+        <p:sp>
+          <p:nvSpPr>
+            <p:cNvPr id="14" name="Line 92">
+              <a:extLst>
+                <a:ext uri="{FF2B5EF4-FFF2-40B4-BE49-F238E27FC236}">
+                  <a16:creationId xmlns:a16="http://schemas.microsoft.com/office/drawing/2014/main" id="{90862457-02BA-CF3C-8850-3627E428FB05}"/>
+                </a:ext>
+              </a:extLst>
+            </p:cNvPr>
+            <p:cNvSpPr>
+              <a:spLocks noChangeShapeType="1"/>
+            </p:cNvSpPr>
+            <p:nvPr/>
+          </p:nvSpPr>
+          <p:spPr bwMode="auto">
+            <a:xfrm>
+              <a:off x="7178676" y="3917951"/>
+              <a:ext cx="0" cy="30163"/>
+            </a:xfrm>
+            <a:prstGeom prst="line">
+              <a:avLst/>
+            </a:prstGeom>
+            <a:noFill/>
+            <a:ln w="9525" cap="rnd">
+              <a:solidFill>
+                <a:schemeClr val="bg1"/>
+              </a:solidFill>
+              <a:prstDash val="solid"/>
+              <a:round/>
+              <a:headEnd/>
+              <a:tailEnd/>
+            </a:ln>
+            <a:extLst>
+              <a:ext uri="{909E8E84-426E-40DD-AFC4-6F175D3DCCD1}">
+                <a14:hiddenFill xmlns:a14="http://schemas.microsoft.com/office/drawing/2010/main">
+                  <a:noFill/>
+                </a14:hiddenFill>
+              </a:ext>
+            </a:extLst>
+          </p:spPr>
+          <p:txBody>
+            <a:bodyPr vert="horz" wrap="square" lIns="91440" tIns="45720" rIns="91440" bIns="45720" numCol="1" anchor="t" anchorCtr="0" compatLnSpc="1">
+              <a:prstTxWarp prst="textNoShape">
+                <a:avLst/>
+              </a:prstTxWarp>
+            </a:bodyPr>
+            <a:lstStyle/>
+            <a:p>
+              <a:endParaRPr lang="id-ID"/>
+            </a:p>
+          </p:txBody>
+        </p:sp>
+        <p:sp>
+          <p:nvSpPr>
+            <p:cNvPr id="15" name="Oval 93">
+              <a:extLst>
+                <a:ext uri="{FF2B5EF4-FFF2-40B4-BE49-F238E27FC236}">
+                  <a16:creationId xmlns:a16="http://schemas.microsoft.com/office/drawing/2014/main" id="{0B1FEE66-A87A-58D9-AF49-7432543A30F0}"/>
+                </a:ext>
+              </a:extLst>
+            </p:cNvPr>
+            <p:cNvSpPr>
+              <a:spLocks noChangeArrowheads="1"/>
+            </p:cNvSpPr>
+            <p:nvPr/>
+          </p:nvSpPr>
+          <p:spPr bwMode="auto">
+            <a:xfrm>
+              <a:off x="7170738" y="3881438"/>
+              <a:ext cx="14288" cy="14288"/>
+            </a:xfrm>
+            <a:prstGeom prst="ellipse">
+              <a:avLst/>
+            </a:prstGeom>
+            <a:noFill/>
+            <a:ln w="9525" cap="flat">
+              <a:solidFill>
+                <a:schemeClr val="bg1"/>
+              </a:solidFill>
+              <a:prstDash val="solid"/>
+              <a:round/>
+              <a:headEnd/>
+              <a:tailEnd/>
+            </a:ln>
+            <a:extLst>
+              <a:ext uri="{909E8E84-426E-40DD-AFC4-6F175D3DCCD1}">
+                <a14:hiddenFill xmlns:a14="http://schemas.microsoft.com/office/drawing/2010/main">
+                  <a:solidFill>
+                    <a:srgbClr val="FFFFFF"/>
+                  </a:solidFill>
+                </a14:hiddenFill>
+              </a:ext>
+            </a:extLst>
+          </p:spPr>
+          <p:txBody>
+            <a:bodyPr vert="horz" wrap="square" lIns="91440" tIns="45720" rIns="91440" bIns="45720" numCol="1" anchor="t" anchorCtr="0" compatLnSpc="1">
+              <a:prstTxWarp prst="textNoShape">
+                <a:avLst/>
+              </a:prstTxWarp>
+            </a:bodyPr>
+            <a:lstStyle/>
+            <a:p>
+              <a:endParaRPr lang="id-ID"/>
+            </a:p>
+          </p:txBody>
+        </p:sp>
+        <p:sp>
+          <p:nvSpPr>
+            <p:cNvPr id="16" name="Line 94">
+              <a:extLst>
+                <a:ext uri="{FF2B5EF4-FFF2-40B4-BE49-F238E27FC236}">
+                  <a16:creationId xmlns:a16="http://schemas.microsoft.com/office/drawing/2014/main" id="{9CAAF5E4-B610-CFC0-67B8-307CAB29B9E7}"/>
+                </a:ext>
+              </a:extLst>
+            </p:cNvPr>
+            <p:cNvSpPr>
+              <a:spLocks noChangeShapeType="1"/>
+            </p:cNvSpPr>
+            <p:nvPr/>
+          </p:nvSpPr>
+          <p:spPr bwMode="auto">
+            <a:xfrm>
+              <a:off x="7005638" y="3857626"/>
+              <a:ext cx="344488" cy="0"/>
+            </a:xfrm>
+            <a:prstGeom prst="line">
+              <a:avLst/>
+            </a:prstGeom>
+            <a:noFill/>
+            <a:ln w="9525" cap="flat">
+              <a:solidFill>
+                <a:schemeClr val="bg1"/>
+              </a:solidFill>
+              <a:prstDash val="solid"/>
+              <a:round/>
+              <a:headEnd/>
+              <a:tailEnd/>
+            </a:ln>
+            <a:extLst>
+              <a:ext uri="{909E8E84-426E-40DD-AFC4-6F175D3DCCD1}">
+                <a14:hiddenFill xmlns:a14="http://schemas.microsoft.com/office/drawing/2010/main">
+                  <a:noFill/>
+                </a14:hiddenFill>
+              </a:ext>
+            </a:extLst>
+          </p:spPr>
+          <p:txBody>
+            <a:bodyPr vert="horz" wrap="square" lIns="91440" tIns="45720" rIns="91440" bIns="45720" numCol="1" anchor="t" anchorCtr="0" compatLnSpc="1">
+              <a:prstTxWarp prst="textNoShape">
+                <a:avLst/>
+              </a:prstTxWarp>
+            </a:bodyPr>
+            <a:lstStyle/>
+            <a:p>
+              <a:endParaRPr lang="id-ID"/>
+            </a:p>
+          </p:txBody>
+        </p:sp>
+        <p:sp>
+          <p:nvSpPr>
+            <p:cNvPr id="17" name="Freeform 95">
+              <a:extLst>
+                <a:ext uri="{FF2B5EF4-FFF2-40B4-BE49-F238E27FC236}">
+                  <a16:creationId xmlns:a16="http://schemas.microsoft.com/office/drawing/2014/main" id="{9C1470DC-A351-F187-760E-46AB14A5ACD2}"/>
+                </a:ext>
+              </a:extLst>
+            </p:cNvPr>
+            <p:cNvSpPr>
+              <a:spLocks/>
+            </p:cNvSpPr>
+            <p:nvPr/>
+          </p:nvSpPr>
+          <p:spPr bwMode="auto">
+            <a:xfrm>
+              <a:off x="7140576" y="3703638"/>
+              <a:ext cx="82550" cy="101600"/>
+            </a:xfrm>
+            <a:custGeom>
+              <a:avLst/>
+              <a:gdLst>
+                <a:gd name="T0" fmla="*/ 0 w 52"/>
+                <a:gd name="T1" fmla="*/ 0 h 64"/>
+                <a:gd name="T2" fmla="*/ 0 w 52"/>
+                <a:gd name="T3" fmla="*/ 64 h 64"/>
+                <a:gd name="T4" fmla="*/ 52 w 52"/>
+                <a:gd name="T5" fmla="*/ 33 h 64"/>
+                <a:gd name="T6" fmla="*/ 0 w 52"/>
+                <a:gd name="T7" fmla="*/ 0 h 64"/>
+              </a:gdLst>
+              <a:ahLst/>
+              <a:cxnLst>
+                <a:cxn ang="0">
+                  <a:pos x="T0" y="T1"/>
+                </a:cxn>
+                <a:cxn ang="0">
+                  <a:pos x="T2" y="T3"/>
+                </a:cxn>
+                <a:cxn ang="0">
+                  <a:pos x="T4" y="T5"/>
+                </a:cxn>
+                <a:cxn ang="0">
+                  <a:pos x="T6" y="T7"/>
+                </a:cxn>
+              </a:cxnLst>
+              <a:rect l="0" t="0" r="r" b="b"/>
+              <a:pathLst>
+                <a:path w="52" h="64">
+                  <a:moveTo>
+                    <a:pt x="0" y="0"/>
+                  </a:moveTo>
+                  <a:lnTo>
+                    <a:pt x="0" y="64"/>
+                  </a:lnTo>
+                  <a:lnTo>
+                    <a:pt x="52" y="33"/>
+                  </a:lnTo>
+                  <a:lnTo>
+                    <a:pt x="0" y="0"/>
+                  </a:lnTo>
+                  <a:close/>
+                </a:path>
+              </a:pathLst>
+            </a:custGeom>
+            <a:noFill/>
+            <a:ln w="9525" cap="flat">
+              <a:solidFill>
+                <a:schemeClr val="bg1"/>
+              </a:solidFill>
+              <a:prstDash val="solid"/>
+              <a:round/>
+              <a:headEnd/>
+              <a:tailEnd/>
+            </a:ln>
+            <a:extLst>
+              <a:ext uri="{909E8E84-426E-40DD-AFC4-6F175D3DCCD1}">
+                <a14:hiddenFill xmlns:a14="http://schemas.microsoft.com/office/drawing/2010/main">
+                  <a:solidFill>
+                    <a:srgbClr val="FFFFFF"/>
+                  </a:solidFill>
+                </a14:hiddenFill>
+              </a:ext>
+            </a:extLst>
+          </p:spPr>
+          <p:txBody>
+            <a:bodyPr vert="horz" wrap="square" lIns="91440" tIns="45720" rIns="91440" bIns="45720" numCol="1" anchor="t" anchorCtr="0" compatLnSpc="1">
+              <a:prstTxWarp prst="textNoShape">
+                <a:avLst/>
+              </a:prstTxWarp>
+            </a:bodyPr>
+            <a:lstStyle/>
+            <a:p>
+              <a:endParaRPr lang="id-ID"/>
+            </a:p>
+          </p:txBody>
+        </p:sp>
+      </p:grpSp>
+      <p:grpSp>
+        <p:nvGrpSpPr>
+          <p:cNvPr id="20" name="Group 1">
+            <a:extLst>
+              <a:ext uri="{FF2B5EF4-FFF2-40B4-BE49-F238E27FC236}">
+                <a16:creationId xmlns:a16="http://schemas.microsoft.com/office/drawing/2014/main" id="{15548E8D-DA46-F6DC-F8C4-FF4C919B20B5}"/>
+              </a:ext>
+            </a:extLst>
+          </p:cNvPr>
+          <p:cNvGrpSpPr>
+            <a:grpSpLocks noChangeAspect="1"/>
+          </p:cNvGrpSpPr>
+          <p:nvPr/>
+        </p:nvGrpSpPr>
+        <p:grpSpPr>
+          <a:xfrm>
+            <a:off x="602808" y="1919421"/>
+            <a:ext cx="236623" cy="216000"/>
+            <a:chOff x="3398838" y="5076826"/>
+            <a:chExt cx="346075" cy="315913"/>
+          </a:xfrm>
+        </p:grpSpPr>
+        <p:sp>
+          <p:nvSpPr>
+            <p:cNvPr id="23" name="Rectangle 80">
+              <a:extLst>
+                <a:ext uri="{FF2B5EF4-FFF2-40B4-BE49-F238E27FC236}">
+                  <a16:creationId xmlns:a16="http://schemas.microsoft.com/office/drawing/2014/main" id="{377714EA-9945-8C7C-6101-CB26744BEB9D}"/>
+                </a:ext>
+              </a:extLst>
+            </p:cNvPr>
+            <p:cNvSpPr>
+              <a:spLocks noChangeArrowheads="1"/>
+            </p:cNvSpPr>
+            <p:nvPr/>
+          </p:nvSpPr>
+          <p:spPr bwMode="auto">
+            <a:xfrm>
+              <a:off x="3519488" y="5076826"/>
+              <a:ext cx="225425" cy="74613"/>
+            </a:xfrm>
+            <a:prstGeom prst="rect">
+              <a:avLst/>
+            </a:prstGeom>
+            <a:noFill/>
+            <a:ln w="12700" cap="rnd">
+              <a:solidFill>
+                <a:schemeClr val="bg1"/>
+              </a:solidFill>
+              <a:prstDash val="solid"/>
+              <a:round/>
+              <a:headEnd/>
+              <a:tailEnd/>
+            </a:ln>
+            <a:extLst>
+              <a:ext uri="{909E8E84-426E-40DD-AFC4-6F175D3DCCD1}">
+                <a14:hiddenFill xmlns:a14="http://schemas.microsoft.com/office/drawing/2010/main">
+                  <a:solidFill>
+                    <a:srgbClr val="FFFFFF"/>
+                  </a:solidFill>
+                </a14:hiddenFill>
+              </a:ext>
+            </a:extLst>
+          </p:spPr>
+          <p:txBody>
+            <a:bodyPr vert="horz" wrap="square" lIns="91440" tIns="45720" rIns="91440" bIns="45720" numCol="1" anchor="t" anchorCtr="0" compatLnSpc="1">
+              <a:prstTxWarp prst="textNoShape">
+                <a:avLst/>
+              </a:prstTxWarp>
+            </a:bodyPr>
+            <a:lstStyle/>
+            <a:p>
+              <a:endParaRPr lang="id-ID"/>
+            </a:p>
+          </p:txBody>
+        </p:sp>
+        <p:sp>
+          <p:nvSpPr>
+            <p:cNvPr id="24" name="Rectangle 81">
+              <a:extLst>
+                <a:ext uri="{FF2B5EF4-FFF2-40B4-BE49-F238E27FC236}">
+                  <a16:creationId xmlns:a16="http://schemas.microsoft.com/office/drawing/2014/main" id="{999D1A82-0B57-13FE-0694-D479B060535E}"/>
+                </a:ext>
+              </a:extLst>
+            </p:cNvPr>
+            <p:cNvSpPr>
+              <a:spLocks noChangeArrowheads="1"/>
+            </p:cNvSpPr>
+            <p:nvPr/>
+          </p:nvSpPr>
+          <p:spPr bwMode="auto">
+            <a:xfrm>
+              <a:off x="3519488" y="5197476"/>
+              <a:ext cx="225425" cy="74613"/>
+            </a:xfrm>
+            <a:prstGeom prst="rect">
+              <a:avLst/>
+            </a:prstGeom>
+            <a:noFill/>
+            <a:ln w="12700" cap="rnd">
+              <a:solidFill>
+                <a:schemeClr val="bg1"/>
+              </a:solidFill>
+              <a:prstDash val="solid"/>
+              <a:round/>
+              <a:headEnd/>
+              <a:tailEnd/>
+            </a:ln>
+            <a:extLst>
+              <a:ext uri="{909E8E84-426E-40DD-AFC4-6F175D3DCCD1}">
+                <a14:hiddenFill xmlns:a14="http://schemas.microsoft.com/office/drawing/2010/main">
+                  <a:solidFill>
+                    <a:srgbClr val="FFFFFF"/>
+                  </a:solidFill>
+                </a14:hiddenFill>
+              </a:ext>
+            </a:extLst>
+          </p:spPr>
+          <p:txBody>
+            <a:bodyPr vert="horz" wrap="square" lIns="91440" tIns="45720" rIns="91440" bIns="45720" numCol="1" anchor="t" anchorCtr="0" compatLnSpc="1">
+              <a:prstTxWarp prst="textNoShape">
+                <a:avLst/>
+              </a:prstTxWarp>
+            </a:bodyPr>
+            <a:lstStyle/>
+            <a:p>
+              <a:endParaRPr lang="id-ID"/>
+            </a:p>
+          </p:txBody>
+        </p:sp>
+        <p:sp>
+          <p:nvSpPr>
+            <p:cNvPr id="25" name="Rectangle 82">
+              <a:extLst>
+                <a:ext uri="{FF2B5EF4-FFF2-40B4-BE49-F238E27FC236}">
+                  <a16:creationId xmlns:a16="http://schemas.microsoft.com/office/drawing/2014/main" id="{AF3AA778-A66C-CD25-2479-162712D0EB20}"/>
+                </a:ext>
+              </a:extLst>
+            </p:cNvPr>
+            <p:cNvSpPr>
+              <a:spLocks noChangeArrowheads="1"/>
+            </p:cNvSpPr>
+            <p:nvPr/>
+          </p:nvSpPr>
+          <p:spPr bwMode="auto">
+            <a:xfrm>
+              <a:off x="3519488" y="5316539"/>
+              <a:ext cx="225425" cy="76200"/>
+            </a:xfrm>
+            <a:prstGeom prst="rect">
+              <a:avLst/>
+            </a:prstGeom>
+            <a:noFill/>
+            <a:ln w="12700" cap="rnd">
+              <a:solidFill>
+                <a:schemeClr val="bg1"/>
+              </a:solidFill>
+              <a:prstDash val="solid"/>
+              <a:round/>
+              <a:headEnd/>
+              <a:tailEnd/>
+            </a:ln>
+            <a:extLst>
+              <a:ext uri="{909E8E84-426E-40DD-AFC4-6F175D3DCCD1}">
+                <a14:hiddenFill xmlns:a14="http://schemas.microsoft.com/office/drawing/2010/main">
+                  <a:solidFill>
+                    <a:srgbClr val="FFFFFF"/>
+                  </a:solidFill>
+                </a14:hiddenFill>
+              </a:ext>
+            </a:extLst>
+          </p:spPr>
+          <p:txBody>
+            <a:bodyPr vert="horz" wrap="square" lIns="91440" tIns="45720" rIns="91440" bIns="45720" numCol="1" anchor="t" anchorCtr="0" compatLnSpc="1">
+              <a:prstTxWarp prst="textNoShape">
+                <a:avLst/>
+              </a:prstTxWarp>
+            </a:bodyPr>
+            <a:lstStyle/>
+            <a:p>
+              <a:endParaRPr lang="id-ID"/>
+            </a:p>
+          </p:txBody>
+        </p:sp>
+        <p:sp>
+          <p:nvSpPr>
+            <p:cNvPr id="26" name="Rectangle 83">
+              <a:extLst>
+                <a:ext uri="{FF2B5EF4-FFF2-40B4-BE49-F238E27FC236}">
+                  <a16:creationId xmlns:a16="http://schemas.microsoft.com/office/drawing/2014/main" id="{48106F25-3D59-EB10-F2CC-66671174BAA7}"/>
+                </a:ext>
+              </a:extLst>
+            </p:cNvPr>
+            <p:cNvSpPr>
+              <a:spLocks noChangeArrowheads="1"/>
+            </p:cNvSpPr>
+            <p:nvPr/>
+          </p:nvSpPr>
+          <p:spPr bwMode="auto">
+            <a:xfrm>
+              <a:off x="3398838" y="5076826"/>
+              <a:ext cx="74613" cy="74613"/>
+            </a:xfrm>
+            <a:prstGeom prst="rect">
+              <a:avLst/>
+            </a:prstGeom>
+            <a:noFill/>
+            <a:ln w="12700" cap="rnd">
+              <a:solidFill>
+                <a:schemeClr val="bg1"/>
+              </a:solidFill>
+              <a:prstDash val="solid"/>
+              <a:round/>
+              <a:headEnd/>
+              <a:tailEnd/>
+            </a:ln>
+            <a:extLst>
+              <a:ext uri="{909E8E84-426E-40DD-AFC4-6F175D3DCCD1}">
+                <a14:hiddenFill xmlns:a14="http://schemas.microsoft.com/office/drawing/2010/main">
+                  <a:solidFill>
+                    <a:srgbClr val="FFFFFF"/>
+                  </a:solidFill>
+                </a14:hiddenFill>
+              </a:ext>
+            </a:extLst>
+          </p:spPr>
+          <p:txBody>
+            <a:bodyPr vert="horz" wrap="square" lIns="91440" tIns="45720" rIns="91440" bIns="45720" numCol="1" anchor="t" anchorCtr="0" compatLnSpc="1">
+              <a:prstTxWarp prst="textNoShape">
+                <a:avLst/>
+              </a:prstTxWarp>
+            </a:bodyPr>
+            <a:lstStyle/>
+            <a:p>
+              <a:endParaRPr lang="id-ID"/>
+            </a:p>
+          </p:txBody>
+        </p:sp>
+        <p:sp>
+          <p:nvSpPr>
+            <p:cNvPr id="28" name="Rectangle 84">
+              <a:extLst>
+                <a:ext uri="{FF2B5EF4-FFF2-40B4-BE49-F238E27FC236}">
+                  <a16:creationId xmlns:a16="http://schemas.microsoft.com/office/drawing/2014/main" id="{6943729F-ED5A-B2CE-9178-932B78B8298A}"/>
+                </a:ext>
+              </a:extLst>
+            </p:cNvPr>
+            <p:cNvSpPr>
+              <a:spLocks noChangeArrowheads="1"/>
+            </p:cNvSpPr>
+            <p:nvPr/>
+          </p:nvSpPr>
+          <p:spPr bwMode="auto">
+            <a:xfrm>
+              <a:off x="3398838" y="5197476"/>
+              <a:ext cx="74613" cy="74613"/>
+            </a:xfrm>
+            <a:prstGeom prst="rect">
+              <a:avLst/>
+            </a:prstGeom>
+            <a:noFill/>
+            <a:ln w="12700" cap="rnd">
+              <a:solidFill>
+                <a:schemeClr val="bg1"/>
+              </a:solidFill>
+              <a:prstDash val="solid"/>
+              <a:round/>
+              <a:headEnd/>
+              <a:tailEnd/>
+            </a:ln>
+            <a:extLst>
+              <a:ext uri="{909E8E84-426E-40DD-AFC4-6F175D3DCCD1}">
+                <a14:hiddenFill xmlns:a14="http://schemas.microsoft.com/office/drawing/2010/main">
+                  <a:solidFill>
+                    <a:srgbClr val="FFFFFF"/>
+                  </a:solidFill>
+                </a14:hiddenFill>
+              </a:ext>
+            </a:extLst>
+          </p:spPr>
+          <p:txBody>
+            <a:bodyPr vert="horz" wrap="square" lIns="91440" tIns="45720" rIns="91440" bIns="45720" numCol="1" anchor="t" anchorCtr="0" compatLnSpc="1">
+              <a:prstTxWarp prst="textNoShape">
+                <a:avLst/>
+              </a:prstTxWarp>
+            </a:bodyPr>
+            <a:lstStyle/>
+            <a:p>
+              <a:endParaRPr lang="id-ID"/>
+            </a:p>
+          </p:txBody>
+        </p:sp>
+        <p:sp>
+          <p:nvSpPr>
+            <p:cNvPr id="30" name="Rectangle 85">
+              <a:extLst>
+                <a:ext uri="{FF2B5EF4-FFF2-40B4-BE49-F238E27FC236}">
+                  <a16:creationId xmlns:a16="http://schemas.microsoft.com/office/drawing/2014/main" id="{EFB86162-B636-B861-4ED0-C88EB74D2CE6}"/>
+                </a:ext>
+              </a:extLst>
+            </p:cNvPr>
+            <p:cNvSpPr>
+              <a:spLocks noChangeArrowheads="1"/>
+            </p:cNvSpPr>
+            <p:nvPr/>
+          </p:nvSpPr>
+          <p:spPr bwMode="auto">
+            <a:xfrm>
+              <a:off x="3398838" y="5316539"/>
+              <a:ext cx="74613" cy="76200"/>
+            </a:xfrm>
+            <a:prstGeom prst="rect">
+              <a:avLst/>
+            </a:prstGeom>
+            <a:noFill/>
+            <a:ln w="12700" cap="rnd">
+              <a:solidFill>
+                <a:schemeClr val="bg1"/>
+              </a:solidFill>
+              <a:prstDash val="solid"/>
+              <a:round/>
+              <a:headEnd/>
+              <a:tailEnd/>
+            </a:ln>
+            <a:extLst>
+              <a:ext uri="{909E8E84-426E-40DD-AFC4-6F175D3DCCD1}">
+                <a14:hiddenFill xmlns:a14="http://schemas.microsoft.com/office/drawing/2010/main">
+                  <a:solidFill>
+                    <a:srgbClr val="FFFFFF"/>
+                  </a:solidFill>
+                </a14:hiddenFill>
+              </a:ext>
+            </a:extLst>
+          </p:spPr>
+          <p:txBody>
+            <a:bodyPr vert="horz" wrap="square" lIns="91440" tIns="45720" rIns="91440" bIns="45720" numCol="1" anchor="t" anchorCtr="0" compatLnSpc="1">
+              <a:prstTxWarp prst="textNoShape">
+                <a:avLst/>
+              </a:prstTxWarp>
+            </a:bodyPr>
+            <a:lstStyle/>
+            <a:p>
+              <a:endParaRPr lang="id-ID"/>
+            </a:p>
+          </p:txBody>
+        </p:sp>
+      </p:grpSp>
+      <p:pic>
+        <p:nvPicPr>
+          <p:cNvPr id="4" name="Grafik 3">
+            <a:extLst>
+              <a:ext uri="{FF2B5EF4-FFF2-40B4-BE49-F238E27FC236}">
+                <a16:creationId xmlns:a16="http://schemas.microsoft.com/office/drawing/2014/main" id="{4364C1F1-241D-DAE6-366A-F021ABF143B7}"/>
+              </a:ext>
+            </a:extLst>
+          </p:cNvPr>
+          <p:cNvPicPr>
+            <a:picLocks noChangeAspect="1"/>
+          </p:cNvPicPr>
+          <p:nvPr/>
+        </p:nvPicPr>
+        <p:blipFill>
+          <a:blip r:embed="rId3"/>
+          <a:stretch>
+            <a:fillRect/>
+          </a:stretch>
+        </p:blipFill>
+        <p:spPr>
+          <a:xfrm>
+            <a:off x="3603520" y="1551170"/>
+            <a:ext cx="8070044" cy="4253282"/>
+          </a:xfrm>
+          <a:prstGeom prst="rect">
+            <a:avLst/>
+          </a:prstGeom>
+        </p:spPr>
+      </p:pic>
+    </p:spTree>
+    <p:extLst>
+      <p:ext uri="{BB962C8B-B14F-4D97-AF65-F5344CB8AC3E}">
+        <p14:creationId xmlns:p14="http://schemas.microsoft.com/office/powerpoint/2010/main" val="3331792296"/>
+      </p:ext>
+    </p:extLst>
+  </p:cSld>
+  <p:clrMapOvr>
+    <a:masterClrMapping/>
+  </p:clrMapOvr>
+</p:sld>
+</file>
+
+<file path=ppt/slides/slide11.xml><?xml version="1.0" encoding="utf-8"?>
+<p:sld xmlns:a="http://schemas.openxmlformats.org/drawingml/2006/main" xmlns:r="http://schemas.openxmlformats.org/officeDocument/2006/relationships" xmlns:p="http://schemas.openxmlformats.org/presentationml/2006/main">
+  <p:cSld>
     <p:spTree>
       <p:nvGrpSpPr>
         <p:cNvPr id="1" name=""/>
@@ -7795,6 +8957,54 @@
               <a:buAutoNum type="arabicPeriod"/>
             </a:pPr>
             <a:r>
+              <a:rPr lang="de-AT" sz="2800" dirty="0">
+                <a:solidFill>
+                  <a:schemeClr val="bg1"/>
+                </a:solidFill>
+                <a:latin typeface="Söhne"/>
+              </a:rPr>
+              <a:t>Remove </a:t>
+            </a:r>
+            <a:r>
+              <a:rPr lang="de-AT" sz="2800" dirty="0" err="1">
+                <a:solidFill>
+                  <a:schemeClr val="bg1"/>
+                </a:solidFill>
+                <a:latin typeface="Söhne"/>
+              </a:rPr>
+              <a:t>numbers</a:t>
+            </a:r>
+            <a:r>
+              <a:rPr lang="de-AT" sz="2800" dirty="0">
+                <a:solidFill>
+                  <a:schemeClr val="bg1"/>
+                </a:solidFill>
+                <a:latin typeface="Söhne"/>
+              </a:rPr>
+              <a:t> and  </a:t>
+            </a:r>
+            <a:r>
+              <a:rPr lang="de-AT" sz="2800" dirty="0" err="1">
+                <a:solidFill>
+                  <a:schemeClr val="bg1"/>
+                </a:solidFill>
+                <a:latin typeface="Söhne"/>
+              </a:rPr>
+              <a:t>punctuation</a:t>
+            </a:r>
+            <a:endParaRPr lang="de-AT" sz="2800" dirty="0">
+              <a:solidFill>
+                <a:schemeClr val="bg1"/>
+              </a:solidFill>
+              <a:latin typeface="Söhne"/>
+            </a:endParaRPr>
+          </a:p>
+          <a:p>
+            <a:pPr marL="971550" lvl="1" indent="-514350">
+              <a:buFont typeface="+mj-lt"/>
+              <a:buAutoNum type="arabicPeriod"/>
+            </a:pPr>
+            <a:r>
               <a:rPr lang="de-AT" sz="2800" dirty="0" err="1">
                 <a:solidFill>
                   <a:schemeClr val="bg1"/>
@@ -8702,6 +9912,36 @@
           </p:txBody>
         </p:sp>
       </p:grpSp>
+      <p:pic>
+        <p:nvPicPr>
+          <p:cNvPr id="3" name="Grafik 2">
+            <a:extLst>
+              <a:ext uri="{FF2B5EF4-FFF2-40B4-BE49-F238E27FC236}">
+                <a16:creationId xmlns:a16="http://schemas.microsoft.com/office/drawing/2014/main" id="{382C2BD3-4FE4-03F1-F6CD-B9E22B251EDB}"/>
+              </a:ext>
+            </a:extLst>
+          </p:cNvPr>
+          <p:cNvPicPr>
+            <a:picLocks noChangeAspect="1"/>
+          </p:cNvPicPr>
+          <p:nvPr/>
+        </p:nvPicPr>
+        <p:blipFill>
+          <a:blip r:embed="rId3"/>
+          <a:stretch>
+            <a:fillRect/>
+          </a:stretch>
+        </p:blipFill>
+        <p:spPr>
+          <a:xfrm>
+            <a:off x="10192447" y="3429000"/>
+            <a:ext cx="1143000" cy="2286000"/>
+          </a:xfrm>
+          <a:prstGeom prst="rect">
+            <a:avLst/>
+          </a:prstGeom>
+        </p:spPr>
+      </p:pic>
     </p:spTree>
     <p:extLst>
       <p:ext uri="{BB962C8B-B14F-4D97-AF65-F5344CB8AC3E}">
@@ -10429,423 +11669,6 @@
       </p:sp>
       <p:sp>
         <p:nvSpPr>
-          <p:cNvPr id="48" name="TextBox 47">
-            <a:extLst>
-              <a:ext uri="{FF2B5EF4-FFF2-40B4-BE49-F238E27FC236}">
-                <a16:creationId xmlns:a16="http://schemas.microsoft.com/office/drawing/2014/main" id="{E4CCABAB-F10A-642D-34EC-706C8A69764F}"/>
-              </a:ext>
-            </a:extLst>
-          </p:cNvPr>
-          <p:cNvSpPr txBox="1"/>
-          <p:nvPr/>
-        </p:nvSpPr>
-        <p:spPr>
-          <a:xfrm>
-            <a:off x="3678541" y="1569060"/>
-            <a:ext cx="7929163" cy="4431689"/>
-          </a:xfrm>
-          <a:prstGeom prst="rect">
-            <a:avLst/>
-          </a:prstGeom>
-          <a:noFill/>
-        </p:spPr>
-        <p:txBody>
-          <a:bodyPr wrap="square" lIns="0" rIns="0" rtlCol="0" anchor="t" anchorCtr="0">
-            <a:noAutofit/>
-          </a:bodyPr>
-          <a:lstStyle/>
-          <a:p>
-            <a:pPr algn="l"/>
-            <a:r>
-              <a:rPr lang="de-AT" sz="2800" b="0" i="0" u="none" strike="noStrike" dirty="0" err="1">
-                <a:solidFill>
-                  <a:schemeClr val="bg1"/>
-                </a:solidFill>
-                <a:effectLst/>
-                <a:latin typeface="Söhne"/>
-              </a:rPr>
-              <a:t>Statistics</a:t>
-            </a:r>
-            <a:r>
-              <a:rPr lang="de-AT" sz="2800" b="0" i="0" u="none" strike="noStrike" dirty="0">
-                <a:solidFill>
-                  <a:schemeClr val="bg1"/>
-                </a:solidFill>
-                <a:effectLst/>
-                <a:latin typeface="Söhne"/>
-              </a:rPr>
-              <a:t> </a:t>
-            </a:r>
-            <a:r>
-              <a:rPr lang="de-AT" sz="2800" b="0" i="0" u="none" strike="noStrike" dirty="0" err="1">
-                <a:solidFill>
-                  <a:schemeClr val="bg1"/>
-                </a:solidFill>
-                <a:effectLst/>
-                <a:latin typeface="Söhne"/>
-              </a:rPr>
-              <a:t>for</a:t>
-            </a:r>
-            <a:r>
-              <a:rPr lang="de-AT" sz="2800" b="0" i="0" u="none" strike="noStrike" dirty="0">
-                <a:solidFill>
-                  <a:schemeClr val="bg1"/>
-                </a:solidFill>
-                <a:effectLst/>
-                <a:latin typeface="Söhne"/>
-              </a:rPr>
-              <a:t> Genres:</a:t>
-            </a:r>
-          </a:p>
-          <a:p>
-            <a:pPr marL="457200" indent="-457200" algn="l">
-              <a:buFont typeface="Arial" panose="020B0604020202020204" pitchFamily="34" charset="0"/>
-              <a:buChar char="•"/>
-            </a:pPr>
-            <a:r>
-              <a:rPr lang="de-AT" sz="2400" dirty="0" err="1">
-                <a:solidFill>
-                  <a:schemeClr val="bg1"/>
-                </a:solidFill>
-                <a:latin typeface="Söhne"/>
-              </a:rPr>
-              <a:t>Number</a:t>
-            </a:r>
-            <a:r>
-              <a:rPr lang="de-AT" sz="2400" dirty="0">
-                <a:solidFill>
-                  <a:schemeClr val="bg1"/>
-                </a:solidFill>
-                <a:latin typeface="Söhne"/>
-              </a:rPr>
-              <a:t> </a:t>
-            </a:r>
-            <a:r>
-              <a:rPr lang="de-AT" sz="2400" dirty="0" err="1">
-                <a:solidFill>
-                  <a:schemeClr val="bg1"/>
-                </a:solidFill>
-                <a:latin typeface="Söhne"/>
-              </a:rPr>
-              <a:t>of</a:t>
-            </a:r>
-            <a:r>
-              <a:rPr lang="de-AT" sz="2400" dirty="0">
-                <a:solidFill>
-                  <a:schemeClr val="bg1"/>
-                </a:solidFill>
-                <a:latin typeface="Söhne"/>
-              </a:rPr>
-              <a:t> </a:t>
-            </a:r>
-            <a:r>
-              <a:rPr lang="de-AT" sz="2400" dirty="0" err="1">
-                <a:solidFill>
-                  <a:schemeClr val="bg1"/>
-                </a:solidFill>
-                <a:latin typeface="Söhne"/>
-              </a:rPr>
-              <a:t>Documents</a:t>
-            </a:r>
-            <a:r>
-              <a:rPr lang="de-AT" sz="2400" dirty="0">
-                <a:solidFill>
-                  <a:schemeClr val="bg1"/>
-                </a:solidFill>
-                <a:latin typeface="Söhne"/>
-              </a:rPr>
-              <a:t>: 32589 </a:t>
-            </a:r>
-            <a:br>
-              <a:rPr lang="de-AT" sz="2400" dirty="0">
-                <a:solidFill>
-                  <a:schemeClr val="bg1"/>
-                </a:solidFill>
-                <a:latin typeface="Söhne"/>
-              </a:rPr>
-            </a:br>
-            <a:r>
-              <a:rPr lang="de-AT" sz="2400" dirty="0">
-                <a:solidFill>
-                  <a:schemeClr val="bg1"/>
-                </a:solidFill>
-                <a:latin typeface="Söhne"/>
-              </a:rPr>
-              <a:t>Average </a:t>
-            </a:r>
-            <a:r>
-              <a:rPr lang="de-AT" sz="2400" dirty="0" err="1">
-                <a:solidFill>
-                  <a:schemeClr val="bg1"/>
-                </a:solidFill>
-                <a:latin typeface="Söhne"/>
-              </a:rPr>
-              <a:t>Document</a:t>
-            </a:r>
-            <a:r>
-              <a:rPr lang="de-AT" sz="2400" dirty="0">
-                <a:solidFill>
-                  <a:schemeClr val="bg1"/>
-                </a:solidFill>
-                <a:latin typeface="Söhne"/>
-              </a:rPr>
-              <a:t> </a:t>
-            </a:r>
-            <a:r>
-              <a:rPr lang="de-AT" sz="2400" dirty="0" err="1">
-                <a:solidFill>
-                  <a:schemeClr val="bg1"/>
-                </a:solidFill>
-                <a:latin typeface="Söhne"/>
-              </a:rPr>
-              <a:t>Length</a:t>
-            </a:r>
-            <a:r>
-              <a:rPr lang="de-AT" sz="2400" dirty="0">
-                <a:solidFill>
-                  <a:schemeClr val="bg1"/>
-                </a:solidFill>
-                <a:latin typeface="Söhne"/>
-              </a:rPr>
-              <a:t>: 2.68 </a:t>
-            </a:r>
-            <a:r>
-              <a:rPr lang="de-AT" sz="2400" dirty="0" err="1">
-                <a:solidFill>
-                  <a:schemeClr val="bg1"/>
-                </a:solidFill>
-                <a:latin typeface="Söhne"/>
-              </a:rPr>
-              <a:t>words</a:t>
-            </a:r>
-            <a:r>
-              <a:rPr lang="de-AT" sz="2400" dirty="0">
-                <a:solidFill>
-                  <a:schemeClr val="bg1"/>
-                </a:solidFill>
-                <a:latin typeface="Söhne"/>
-              </a:rPr>
-              <a:t> </a:t>
-            </a:r>
-            <a:br>
-              <a:rPr lang="de-AT" sz="2400" dirty="0">
-                <a:solidFill>
-                  <a:schemeClr val="bg1"/>
-                </a:solidFill>
-                <a:latin typeface="Söhne"/>
-              </a:rPr>
-            </a:br>
-            <a:r>
-              <a:rPr lang="de-AT" sz="2400" dirty="0">
-                <a:solidFill>
-                  <a:schemeClr val="bg1"/>
-                </a:solidFill>
-                <a:latin typeface="Söhne"/>
-              </a:rPr>
-              <a:t>Minimum </a:t>
-            </a:r>
-            <a:r>
-              <a:rPr lang="de-AT" sz="2400" dirty="0" err="1">
-                <a:solidFill>
-                  <a:schemeClr val="bg1"/>
-                </a:solidFill>
-                <a:latin typeface="Söhne"/>
-              </a:rPr>
-              <a:t>Document</a:t>
-            </a:r>
-            <a:r>
-              <a:rPr lang="de-AT" sz="2400" dirty="0">
-                <a:solidFill>
-                  <a:schemeClr val="bg1"/>
-                </a:solidFill>
-                <a:latin typeface="Söhne"/>
-              </a:rPr>
-              <a:t> </a:t>
-            </a:r>
-            <a:r>
-              <a:rPr lang="de-AT" sz="2400" dirty="0" err="1">
-                <a:solidFill>
-                  <a:schemeClr val="bg1"/>
-                </a:solidFill>
-                <a:latin typeface="Söhne"/>
-              </a:rPr>
-              <a:t>Length</a:t>
-            </a:r>
-            <a:r>
-              <a:rPr lang="de-AT" sz="2400" dirty="0">
-                <a:solidFill>
-                  <a:schemeClr val="bg1"/>
-                </a:solidFill>
-                <a:latin typeface="Söhne"/>
-              </a:rPr>
-              <a:t>: 1 </a:t>
-            </a:r>
-            <a:r>
-              <a:rPr lang="de-AT" sz="2400" dirty="0" err="1">
-                <a:solidFill>
-                  <a:schemeClr val="bg1"/>
-                </a:solidFill>
-                <a:latin typeface="Söhne"/>
-              </a:rPr>
-              <a:t>words</a:t>
-            </a:r>
-            <a:r>
-              <a:rPr lang="de-AT" sz="2400" dirty="0">
-                <a:solidFill>
-                  <a:schemeClr val="bg1"/>
-                </a:solidFill>
-                <a:latin typeface="Söhne"/>
-              </a:rPr>
-              <a:t> </a:t>
-            </a:r>
-            <a:br>
-              <a:rPr lang="de-AT" sz="2400" dirty="0">
-                <a:solidFill>
-                  <a:schemeClr val="bg1"/>
-                </a:solidFill>
-                <a:latin typeface="Söhne"/>
-              </a:rPr>
-            </a:br>
-            <a:r>
-              <a:rPr lang="de-AT" sz="2400" dirty="0">
-                <a:solidFill>
-                  <a:schemeClr val="bg1"/>
-                </a:solidFill>
-                <a:latin typeface="Söhne"/>
-              </a:rPr>
-              <a:t>Maximum </a:t>
-            </a:r>
-            <a:r>
-              <a:rPr lang="de-AT" sz="2400" dirty="0" err="1">
-                <a:solidFill>
-                  <a:schemeClr val="bg1"/>
-                </a:solidFill>
-                <a:latin typeface="Söhne"/>
-              </a:rPr>
-              <a:t>Document</a:t>
-            </a:r>
-            <a:r>
-              <a:rPr lang="de-AT" sz="2400" dirty="0">
-                <a:solidFill>
-                  <a:schemeClr val="bg1"/>
-                </a:solidFill>
-                <a:latin typeface="Söhne"/>
-              </a:rPr>
-              <a:t> </a:t>
-            </a:r>
-            <a:r>
-              <a:rPr lang="de-AT" sz="2400" dirty="0" err="1">
-                <a:solidFill>
-                  <a:schemeClr val="bg1"/>
-                </a:solidFill>
-                <a:latin typeface="Söhne"/>
-              </a:rPr>
-              <a:t>Length</a:t>
-            </a:r>
-            <a:r>
-              <a:rPr lang="de-AT" sz="2400" dirty="0">
-                <a:solidFill>
-                  <a:schemeClr val="bg1"/>
-                </a:solidFill>
-                <a:latin typeface="Söhne"/>
-              </a:rPr>
-              <a:t>: 30 </a:t>
-            </a:r>
-            <a:r>
-              <a:rPr lang="de-AT" sz="2400" dirty="0" err="1">
-                <a:solidFill>
-                  <a:schemeClr val="bg1"/>
-                </a:solidFill>
-                <a:latin typeface="Söhne"/>
-              </a:rPr>
-              <a:t>words</a:t>
-            </a:r>
-            <a:r>
-              <a:rPr lang="de-AT" sz="2400" dirty="0">
-                <a:solidFill>
-                  <a:schemeClr val="bg1"/>
-                </a:solidFill>
-                <a:latin typeface="Söhne"/>
-              </a:rPr>
-              <a:t> </a:t>
-            </a:r>
-            <a:br>
-              <a:rPr lang="de-AT" sz="2400" dirty="0">
-                <a:solidFill>
-                  <a:schemeClr val="bg1"/>
-                </a:solidFill>
-                <a:latin typeface="Söhne"/>
-              </a:rPr>
-            </a:br>
-            <a:r>
-              <a:rPr lang="de-AT" sz="2400" dirty="0" err="1">
-                <a:solidFill>
-                  <a:schemeClr val="bg1"/>
-                </a:solidFill>
-                <a:latin typeface="Söhne"/>
-              </a:rPr>
-              <a:t>Vocabulary</a:t>
-            </a:r>
-            <a:r>
-              <a:rPr lang="de-AT" sz="2400" dirty="0">
-                <a:solidFill>
-                  <a:schemeClr val="bg1"/>
-                </a:solidFill>
-                <a:latin typeface="Söhne"/>
-              </a:rPr>
-              <a:t> Size: 2453 </a:t>
-            </a:r>
-            <a:r>
-              <a:rPr lang="de-AT" sz="2400" dirty="0" err="1">
-                <a:solidFill>
-                  <a:schemeClr val="bg1"/>
-                </a:solidFill>
-                <a:latin typeface="Söhne"/>
-              </a:rPr>
-              <a:t>unique</a:t>
-            </a:r>
-            <a:r>
-              <a:rPr lang="de-AT" sz="2400" dirty="0">
-                <a:solidFill>
-                  <a:schemeClr val="bg1"/>
-                </a:solidFill>
-                <a:latin typeface="Söhne"/>
-              </a:rPr>
-              <a:t> </a:t>
-            </a:r>
-            <a:r>
-              <a:rPr lang="de-AT" sz="2400" dirty="0" err="1">
-                <a:solidFill>
-                  <a:schemeClr val="bg1"/>
-                </a:solidFill>
-                <a:latin typeface="Söhne"/>
-              </a:rPr>
-              <a:t>words</a:t>
-            </a:r>
-            <a:br>
-              <a:rPr lang="de-AT" sz="2800" b="0" i="0" u="none" strike="noStrike" dirty="0">
-                <a:solidFill>
-                  <a:schemeClr val="bg1"/>
-                </a:solidFill>
-                <a:effectLst/>
-                <a:latin typeface="Söhne"/>
-              </a:rPr>
-            </a:br>
-            <a:r>
-              <a:rPr lang="de-AT" sz="2800" b="0" i="0" u="none" strike="noStrike" dirty="0">
-                <a:solidFill>
-                  <a:schemeClr val="bg1"/>
-                </a:solidFill>
-                <a:effectLst/>
-                <a:latin typeface="Söhne"/>
-              </a:rPr>
-              <a:t> </a:t>
-            </a:r>
-          </a:p>
-        </p:txBody>
-      </p:sp>
-      <p:sp>
-        <p:nvSpPr>
           <p:cNvPr id="3" name="TextBox 20">
             <a:extLst>
               <a:ext uri="{FF2B5EF4-FFF2-40B4-BE49-F238E27FC236}">
@@ -11767,10 +12590,40 @@
           </p:txBody>
         </p:sp>
       </p:grpSp>
+      <p:pic>
+        <p:nvPicPr>
+          <p:cNvPr id="4" name="Grafik 3">
+            <a:extLst>
+              <a:ext uri="{FF2B5EF4-FFF2-40B4-BE49-F238E27FC236}">
+                <a16:creationId xmlns:a16="http://schemas.microsoft.com/office/drawing/2014/main" id="{2E172568-F5F4-41F4-3060-31A54F0AC114}"/>
+              </a:ext>
+            </a:extLst>
+          </p:cNvPr>
+          <p:cNvPicPr>
+            <a:picLocks noChangeAspect="1"/>
+          </p:cNvPicPr>
+          <p:nvPr/>
+        </p:nvPicPr>
+        <p:blipFill>
+          <a:blip r:embed="rId3"/>
+          <a:stretch>
+            <a:fillRect/>
+          </a:stretch>
+        </p:blipFill>
+        <p:spPr>
+          <a:xfrm>
+            <a:off x="3928036" y="1663723"/>
+            <a:ext cx="7421011" cy="3981550"/>
+          </a:xfrm>
+          <a:prstGeom prst="rect">
+            <a:avLst/>
+          </a:prstGeom>
+        </p:spPr>
+      </p:pic>
     </p:spTree>
     <p:extLst>
       <p:ext uri="{BB962C8B-B14F-4D97-AF65-F5344CB8AC3E}">
-        <p14:creationId xmlns:p14="http://schemas.microsoft.com/office/powerpoint/2010/main" val="3471470630"/>
+        <p14:creationId xmlns:p14="http://schemas.microsoft.com/office/powerpoint/2010/main" val="4269075172"/>
       </p:ext>
     </p:extLst>
   </p:cSld>
@@ -12865,10 +13718,10 @@
       </p:grpSp>
       <p:pic>
         <p:nvPicPr>
-          <p:cNvPr id="4" name="Grafik 3">
+          <p:cNvPr id="2" name="Grafik 1">
             <a:extLst>
               <a:ext uri="{FF2B5EF4-FFF2-40B4-BE49-F238E27FC236}">
-                <a16:creationId xmlns:a16="http://schemas.microsoft.com/office/drawing/2014/main" id="{2E172568-F5F4-41F4-3060-31A54F0AC114}"/>
+                <a16:creationId xmlns:a16="http://schemas.microsoft.com/office/drawing/2014/main" id="{9EB3951C-2213-28B1-AA9F-39D3DCACF726}"/>
               </a:ext>
             </a:extLst>
           </p:cNvPr>
@@ -12885,8 +13738,8 @@
         </p:blipFill>
         <p:spPr>
           <a:xfrm>
-            <a:off x="3928036" y="1663723"/>
-            <a:ext cx="7421011" cy="3981550"/>
+            <a:off x="4690673" y="1619154"/>
+            <a:ext cx="5895738" cy="4203314"/>
           </a:xfrm>
           <a:prstGeom prst="rect">
             <a:avLst/>
@@ -12896,7 +13749,7 @@
     </p:spTree>
     <p:extLst>
       <p:ext uri="{BB962C8B-B14F-4D97-AF65-F5344CB8AC3E}">
-        <p14:creationId xmlns:p14="http://schemas.microsoft.com/office/powerpoint/2010/main" val="4269075172"/>
+        <p14:creationId xmlns:p14="http://schemas.microsoft.com/office/powerpoint/2010/main" val="1844234061"/>
       </p:ext>
     </p:extLst>
   </p:cSld>
@@ -12909,6 +13762,14 @@
 <file path=ppt/slides/slide7.xml><?xml version="1.0" encoding="utf-8"?>
 <p:sld xmlns:a="http://schemas.openxmlformats.org/drawingml/2006/main" xmlns:r="http://schemas.openxmlformats.org/officeDocument/2006/relationships" xmlns:p="http://schemas.openxmlformats.org/presentationml/2006/main">
   <p:cSld>
+    <p:bg>
+      <p:bgPr>
+        <a:solidFill>
+          <a:srgbClr val="191414"/>
+        </a:solidFill>
+        <a:effectLst/>
+      </p:bgPr>
+    </p:bg>
     <p:spTree>
       <p:nvGrpSpPr>
         <p:cNvPr id="1" name=""/>
@@ -13062,6 +13923,636 @@
               </a:solidFill>
               <a:latin typeface="Segoe UI" panose="020B0502040204020203" pitchFamily="34" charset="0"/>
               <a:cs typeface="Segoe UI" panose="020B0502040204020203" pitchFamily="34" charset="0"/>
+            </a:endParaRPr>
+          </a:p>
+        </p:txBody>
+      </p:sp>
+      <p:sp>
+        <p:nvSpPr>
+          <p:cNvPr id="48" name="TextBox 47">
+            <a:extLst>
+              <a:ext uri="{FF2B5EF4-FFF2-40B4-BE49-F238E27FC236}">
+                <a16:creationId xmlns:a16="http://schemas.microsoft.com/office/drawing/2014/main" id="{E4CCABAB-F10A-642D-34EC-706C8A69764F}"/>
+              </a:ext>
+            </a:extLst>
+          </p:cNvPr>
+          <p:cNvSpPr txBox="1"/>
+          <p:nvPr/>
+        </p:nvSpPr>
+        <p:spPr>
+          <a:xfrm>
+            <a:off x="3474402" y="1569060"/>
+            <a:ext cx="7929163" cy="4431689"/>
+          </a:xfrm>
+          <a:prstGeom prst="rect">
+            <a:avLst/>
+          </a:prstGeom>
+          <a:noFill/>
+        </p:spPr>
+        <p:txBody>
+          <a:bodyPr wrap="square" lIns="0" rIns="0" rtlCol="0" anchor="t" anchorCtr="0">
+            <a:noAutofit/>
+          </a:bodyPr>
+          <a:lstStyle/>
+          <a:p>
+            <a:r>
+              <a:rPr lang="de-AT" sz="2800" b="0" i="0" u="none" strike="noStrike" dirty="0" err="1">
+                <a:solidFill>
+                  <a:schemeClr val="bg1"/>
+                </a:solidFill>
+                <a:effectLst/>
+                <a:latin typeface="Söhne"/>
+              </a:rPr>
+              <a:t>Statistics</a:t>
+            </a:r>
+            <a:r>
+              <a:rPr lang="de-AT" sz="2800" b="0" i="0" u="none" strike="noStrike" dirty="0">
+                <a:solidFill>
+                  <a:schemeClr val="bg1"/>
+                </a:solidFill>
+                <a:effectLst/>
+                <a:latin typeface="Söhne"/>
+              </a:rPr>
+              <a:t> </a:t>
+            </a:r>
+            <a:r>
+              <a:rPr lang="de-AT" sz="2800" b="0" i="0" u="none" strike="noStrike" dirty="0" err="1">
+                <a:solidFill>
+                  <a:schemeClr val="bg1"/>
+                </a:solidFill>
+                <a:effectLst/>
+                <a:latin typeface="Söhne"/>
+              </a:rPr>
+              <a:t>for</a:t>
+            </a:r>
+            <a:r>
+              <a:rPr lang="de-AT" sz="2800" b="0" i="0" u="none" strike="noStrike" dirty="0">
+                <a:solidFill>
+                  <a:schemeClr val="bg1"/>
+                </a:solidFill>
+                <a:effectLst/>
+                <a:latin typeface="Söhne"/>
+              </a:rPr>
+              <a:t> Lyrics:</a:t>
+            </a:r>
+          </a:p>
+          <a:p>
+            <a:endParaRPr lang="de-AT" sz="2800" b="0" i="0" dirty="0">
+              <a:solidFill>
+                <a:srgbClr val="D4D4D4"/>
+              </a:solidFill>
+              <a:effectLst/>
+              <a:latin typeface="Menlo" panose="020B0609030804020204" pitchFamily="49" charset="0"/>
+            </a:endParaRPr>
+          </a:p>
+          <a:p>
+            <a:pPr algn="l"/>
+            <a:r>
+              <a:rPr lang="de-AT" b="0" i="0" dirty="0" err="1">
+                <a:solidFill>
+                  <a:srgbClr val="D4D4D4"/>
+                </a:solidFill>
+                <a:effectLst/>
+                <a:latin typeface="Menlo" panose="020B0609030804020204" pitchFamily="49" charset="0"/>
+              </a:rPr>
+              <a:t>Number</a:t>
+            </a:r>
+            <a:r>
+              <a:rPr lang="de-AT" b="0" i="0" dirty="0">
+                <a:solidFill>
+                  <a:srgbClr val="D4D4D4"/>
+                </a:solidFill>
+                <a:effectLst/>
+                <a:latin typeface="Menlo" panose="020B0609030804020204" pitchFamily="49" charset="0"/>
+              </a:rPr>
+              <a:t> </a:t>
+            </a:r>
+            <a:r>
+              <a:rPr lang="de-AT" b="0" i="0" dirty="0" err="1">
+                <a:solidFill>
+                  <a:srgbClr val="D4D4D4"/>
+                </a:solidFill>
+                <a:effectLst/>
+                <a:latin typeface="Menlo" panose="020B0609030804020204" pitchFamily="49" charset="0"/>
+              </a:rPr>
+              <a:t>of</a:t>
+            </a:r>
+            <a:r>
+              <a:rPr lang="de-AT" b="0" i="0" dirty="0">
+                <a:solidFill>
+                  <a:srgbClr val="D4D4D4"/>
+                </a:solidFill>
+                <a:effectLst/>
+                <a:latin typeface="Menlo" panose="020B0609030804020204" pitchFamily="49" charset="0"/>
+              </a:rPr>
+              <a:t> </a:t>
+            </a:r>
+            <a:r>
+              <a:rPr lang="de-AT" b="0" i="0" dirty="0" err="1">
+                <a:solidFill>
+                  <a:srgbClr val="D4D4D4"/>
+                </a:solidFill>
+                <a:effectLst/>
+                <a:latin typeface="Menlo" panose="020B0609030804020204" pitchFamily="49" charset="0"/>
+              </a:rPr>
+              <a:t>Documents</a:t>
+            </a:r>
+            <a:r>
+              <a:rPr lang="de-AT" b="0" i="0" dirty="0">
+                <a:solidFill>
+                  <a:srgbClr val="D4D4D4"/>
+                </a:solidFill>
+                <a:effectLst/>
+                <a:latin typeface="Menlo" panose="020B0609030804020204" pitchFamily="49" charset="0"/>
+              </a:rPr>
+              <a:t>: 25728 </a:t>
+            </a:r>
+          </a:p>
+          <a:p>
+            <a:pPr algn="l"/>
+            <a:r>
+              <a:rPr lang="de-AT" b="0" i="0" dirty="0">
+                <a:solidFill>
+                  <a:srgbClr val="D4D4D4"/>
+                </a:solidFill>
+                <a:effectLst/>
+                <a:latin typeface="Menlo" panose="020B0609030804020204" pitchFamily="49" charset="0"/>
+              </a:rPr>
+              <a:t>Total </a:t>
+            </a:r>
+            <a:r>
+              <a:rPr lang="de-AT" b="0" i="0" dirty="0" err="1">
+                <a:solidFill>
+                  <a:srgbClr val="D4D4D4"/>
+                </a:solidFill>
+                <a:effectLst/>
+                <a:latin typeface="Menlo" panose="020B0609030804020204" pitchFamily="49" charset="0"/>
+              </a:rPr>
+              <a:t>Number</a:t>
+            </a:r>
+            <a:r>
+              <a:rPr lang="de-AT" b="0" i="0" dirty="0">
+                <a:solidFill>
+                  <a:srgbClr val="D4D4D4"/>
+                </a:solidFill>
+                <a:effectLst/>
+                <a:latin typeface="Menlo" panose="020B0609030804020204" pitchFamily="49" charset="0"/>
+              </a:rPr>
+              <a:t> </a:t>
+            </a:r>
+            <a:r>
+              <a:rPr lang="de-AT" b="0" i="0" dirty="0" err="1">
+                <a:solidFill>
+                  <a:srgbClr val="D4D4D4"/>
+                </a:solidFill>
+                <a:effectLst/>
+                <a:latin typeface="Menlo" panose="020B0609030804020204" pitchFamily="49" charset="0"/>
+              </a:rPr>
+              <a:t>of</a:t>
+            </a:r>
+            <a:r>
+              <a:rPr lang="de-AT" b="0" i="0" dirty="0">
+                <a:solidFill>
+                  <a:srgbClr val="D4D4D4"/>
+                </a:solidFill>
+                <a:effectLst/>
+                <a:latin typeface="Menlo" panose="020B0609030804020204" pitchFamily="49" charset="0"/>
+              </a:rPr>
+              <a:t> Words: 9950490 </a:t>
+            </a:r>
+          </a:p>
+          <a:p>
+            <a:pPr algn="l"/>
+            <a:r>
+              <a:rPr lang="de-AT" b="0" i="0" dirty="0">
+                <a:solidFill>
+                  <a:srgbClr val="D4D4D4"/>
+                </a:solidFill>
+                <a:effectLst/>
+                <a:latin typeface="Menlo" panose="020B0609030804020204" pitchFamily="49" charset="0"/>
+              </a:rPr>
+              <a:t>Average </a:t>
+            </a:r>
+            <a:r>
+              <a:rPr lang="de-AT" b="0" i="0" dirty="0" err="1">
+                <a:solidFill>
+                  <a:srgbClr val="D4D4D4"/>
+                </a:solidFill>
+                <a:effectLst/>
+                <a:latin typeface="Menlo" panose="020B0609030804020204" pitchFamily="49" charset="0"/>
+              </a:rPr>
+              <a:t>Document</a:t>
+            </a:r>
+            <a:r>
+              <a:rPr lang="de-AT" b="0" i="0" dirty="0">
+                <a:solidFill>
+                  <a:srgbClr val="D4D4D4"/>
+                </a:solidFill>
+                <a:effectLst/>
+                <a:latin typeface="Menlo" panose="020B0609030804020204" pitchFamily="49" charset="0"/>
+              </a:rPr>
+              <a:t> </a:t>
+            </a:r>
+            <a:r>
+              <a:rPr lang="de-AT" b="0" i="0" dirty="0" err="1">
+                <a:solidFill>
+                  <a:srgbClr val="D4D4D4"/>
+                </a:solidFill>
+                <a:effectLst/>
+                <a:latin typeface="Menlo" panose="020B0609030804020204" pitchFamily="49" charset="0"/>
+              </a:rPr>
+              <a:t>Length</a:t>
+            </a:r>
+            <a:r>
+              <a:rPr lang="de-AT" b="0" i="0" dirty="0">
+                <a:solidFill>
+                  <a:srgbClr val="D4D4D4"/>
+                </a:solidFill>
+                <a:effectLst/>
+                <a:latin typeface="Menlo" panose="020B0609030804020204" pitchFamily="49" charset="0"/>
+              </a:rPr>
+              <a:t>: 386.76 </a:t>
+            </a:r>
+            <a:r>
+              <a:rPr lang="de-AT" b="0" i="0" dirty="0" err="1">
+                <a:solidFill>
+                  <a:srgbClr val="D4D4D4"/>
+                </a:solidFill>
+                <a:effectLst/>
+                <a:latin typeface="Menlo" panose="020B0609030804020204" pitchFamily="49" charset="0"/>
+              </a:rPr>
+              <a:t>words</a:t>
+            </a:r>
+            <a:r>
+              <a:rPr lang="de-AT" b="0" i="0" dirty="0">
+                <a:solidFill>
+                  <a:srgbClr val="D4D4D4"/>
+                </a:solidFill>
+                <a:effectLst/>
+                <a:latin typeface="Menlo" panose="020B0609030804020204" pitchFamily="49" charset="0"/>
+              </a:rPr>
+              <a:t> </a:t>
+            </a:r>
+          </a:p>
+          <a:p>
+            <a:pPr algn="l"/>
+            <a:r>
+              <a:rPr lang="de-AT" b="0" i="0" dirty="0">
+                <a:solidFill>
+                  <a:srgbClr val="D4D4D4"/>
+                </a:solidFill>
+                <a:effectLst/>
+                <a:latin typeface="Menlo" panose="020B0609030804020204" pitchFamily="49" charset="0"/>
+              </a:rPr>
+              <a:t>Minimum </a:t>
+            </a:r>
+            <a:r>
+              <a:rPr lang="de-AT" b="0" i="0" dirty="0" err="1">
+                <a:solidFill>
+                  <a:srgbClr val="D4D4D4"/>
+                </a:solidFill>
+                <a:effectLst/>
+                <a:latin typeface="Menlo" panose="020B0609030804020204" pitchFamily="49" charset="0"/>
+              </a:rPr>
+              <a:t>Document</a:t>
+            </a:r>
+            <a:r>
+              <a:rPr lang="de-AT" b="0" i="0" dirty="0">
+                <a:solidFill>
+                  <a:srgbClr val="D4D4D4"/>
+                </a:solidFill>
+                <a:effectLst/>
+                <a:latin typeface="Menlo" panose="020B0609030804020204" pitchFamily="49" charset="0"/>
+              </a:rPr>
+              <a:t> </a:t>
+            </a:r>
+            <a:r>
+              <a:rPr lang="de-AT" b="0" i="0" dirty="0" err="1">
+                <a:solidFill>
+                  <a:srgbClr val="D4D4D4"/>
+                </a:solidFill>
+                <a:effectLst/>
+                <a:latin typeface="Menlo" panose="020B0609030804020204" pitchFamily="49" charset="0"/>
+              </a:rPr>
+              <a:t>Length</a:t>
+            </a:r>
+            <a:r>
+              <a:rPr lang="de-AT" b="0" i="0" dirty="0">
+                <a:solidFill>
+                  <a:srgbClr val="D4D4D4"/>
+                </a:solidFill>
+                <a:effectLst/>
+                <a:latin typeface="Menlo" panose="020B0609030804020204" pitchFamily="49" charset="0"/>
+              </a:rPr>
+              <a:t>: 2 </a:t>
+            </a:r>
+            <a:r>
+              <a:rPr lang="de-AT" b="0" i="0" dirty="0" err="1">
+                <a:solidFill>
+                  <a:srgbClr val="D4D4D4"/>
+                </a:solidFill>
+                <a:effectLst/>
+                <a:latin typeface="Menlo" panose="020B0609030804020204" pitchFamily="49" charset="0"/>
+              </a:rPr>
+              <a:t>words</a:t>
+            </a:r>
+            <a:r>
+              <a:rPr lang="de-AT" b="0" i="0" dirty="0">
+                <a:solidFill>
+                  <a:srgbClr val="D4D4D4"/>
+                </a:solidFill>
+                <a:effectLst/>
+                <a:latin typeface="Menlo" panose="020B0609030804020204" pitchFamily="49" charset="0"/>
+              </a:rPr>
+              <a:t> </a:t>
+            </a:r>
+          </a:p>
+          <a:p>
+            <a:pPr algn="l"/>
+            <a:r>
+              <a:rPr lang="de-AT" b="0" i="0" dirty="0">
+                <a:solidFill>
+                  <a:srgbClr val="D4D4D4"/>
+                </a:solidFill>
+                <a:effectLst/>
+                <a:latin typeface="Menlo" panose="020B0609030804020204" pitchFamily="49" charset="0"/>
+              </a:rPr>
+              <a:t>Maximum </a:t>
+            </a:r>
+            <a:r>
+              <a:rPr lang="de-AT" b="0" i="0" dirty="0" err="1">
+                <a:solidFill>
+                  <a:srgbClr val="D4D4D4"/>
+                </a:solidFill>
+                <a:effectLst/>
+                <a:latin typeface="Menlo" panose="020B0609030804020204" pitchFamily="49" charset="0"/>
+              </a:rPr>
+              <a:t>Document</a:t>
+            </a:r>
+            <a:r>
+              <a:rPr lang="de-AT" b="0" i="0" dirty="0">
+                <a:solidFill>
+                  <a:srgbClr val="D4D4D4"/>
+                </a:solidFill>
+                <a:effectLst/>
+                <a:latin typeface="Menlo" panose="020B0609030804020204" pitchFamily="49" charset="0"/>
+              </a:rPr>
+              <a:t> </a:t>
+            </a:r>
+            <a:r>
+              <a:rPr lang="de-AT" b="0" i="0" dirty="0" err="1">
+                <a:solidFill>
+                  <a:srgbClr val="D4D4D4"/>
+                </a:solidFill>
+                <a:effectLst/>
+                <a:latin typeface="Menlo" panose="020B0609030804020204" pitchFamily="49" charset="0"/>
+              </a:rPr>
+              <a:t>Length</a:t>
+            </a:r>
+            <a:r>
+              <a:rPr lang="de-AT" b="0" i="0" dirty="0">
+                <a:solidFill>
+                  <a:srgbClr val="D4D4D4"/>
+                </a:solidFill>
+                <a:effectLst/>
+                <a:latin typeface="Menlo" panose="020B0609030804020204" pitchFamily="49" charset="0"/>
+              </a:rPr>
+              <a:t>: 45398 </a:t>
+            </a:r>
+            <a:r>
+              <a:rPr lang="de-AT" b="0" i="0" dirty="0" err="1">
+                <a:solidFill>
+                  <a:srgbClr val="D4D4D4"/>
+                </a:solidFill>
+                <a:effectLst/>
+                <a:latin typeface="Menlo" panose="020B0609030804020204" pitchFamily="49" charset="0"/>
+              </a:rPr>
+              <a:t>words</a:t>
+            </a:r>
+            <a:r>
+              <a:rPr lang="de-AT" b="0" i="0" dirty="0">
+                <a:solidFill>
+                  <a:srgbClr val="D4D4D4"/>
+                </a:solidFill>
+                <a:effectLst/>
+                <a:latin typeface="Menlo" panose="020B0609030804020204" pitchFamily="49" charset="0"/>
+              </a:rPr>
+              <a:t> </a:t>
+            </a:r>
+          </a:p>
+          <a:p>
+            <a:pPr algn="l"/>
+            <a:r>
+              <a:rPr lang="de-AT" b="0" i="0" dirty="0" err="1">
+                <a:solidFill>
+                  <a:srgbClr val="D4D4D4"/>
+                </a:solidFill>
+                <a:effectLst/>
+                <a:latin typeface="Menlo" panose="020B0609030804020204" pitchFamily="49" charset="0"/>
+              </a:rPr>
+              <a:t>Vocabulary</a:t>
+            </a:r>
+            <a:r>
+              <a:rPr lang="de-AT" b="0" i="0" dirty="0">
+                <a:solidFill>
+                  <a:srgbClr val="D4D4D4"/>
+                </a:solidFill>
+                <a:effectLst/>
+                <a:latin typeface="Menlo" panose="020B0609030804020204" pitchFamily="49" charset="0"/>
+              </a:rPr>
+              <a:t> Size: 139469 </a:t>
+            </a:r>
+            <a:r>
+              <a:rPr lang="de-AT" b="0" i="0" dirty="0" err="1">
+                <a:solidFill>
+                  <a:srgbClr val="D4D4D4"/>
+                </a:solidFill>
+                <a:effectLst/>
+                <a:latin typeface="Menlo" panose="020B0609030804020204" pitchFamily="49" charset="0"/>
+              </a:rPr>
+              <a:t>unique</a:t>
+            </a:r>
+            <a:r>
+              <a:rPr lang="de-AT" b="0" i="0" dirty="0">
+                <a:solidFill>
+                  <a:srgbClr val="D4D4D4"/>
+                </a:solidFill>
+                <a:effectLst/>
+                <a:latin typeface="Menlo" panose="020B0609030804020204" pitchFamily="49" charset="0"/>
+              </a:rPr>
+              <a:t> </a:t>
+            </a:r>
+            <a:r>
+              <a:rPr lang="de-AT" b="0" i="0" dirty="0" err="1">
+                <a:solidFill>
+                  <a:srgbClr val="D4D4D4"/>
+                </a:solidFill>
+                <a:effectLst/>
+                <a:latin typeface="Menlo" panose="020B0609030804020204" pitchFamily="49" charset="0"/>
+              </a:rPr>
+              <a:t>words</a:t>
+            </a:r>
+            <a:r>
+              <a:rPr lang="de-AT" b="0" i="0" dirty="0">
+                <a:solidFill>
+                  <a:srgbClr val="D4D4D4"/>
+                </a:solidFill>
+                <a:effectLst/>
+                <a:latin typeface="Menlo" panose="020B0609030804020204" pitchFamily="49" charset="0"/>
+              </a:rPr>
+              <a:t> </a:t>
+            </a:r>
+          </a:p>
+          <a:p>
+            <a:pPr algn="l"/>
+            <a:r>
+              <a:rPr lang="de-AT" b="0" i="0" dirty="0">
+                <a:solidFill>
+                  <a:srgbClr val="D4D4D4"/>
+                </a:solidFill>
+                <a:effectLst/>
+                <a:latin typeface="Menlo" panose="020B0609030804020204" pitchFamily="49" charset="0"/>
+              </a:rPr>
+              <a:t>Most Common Words: [(',', 514354), ('I', 419661), ('</a:t>
+            </a:r>
+            <a:r>
+              <a:rPr lang="de-AT" b="0" i="0" dirty="0" err="1">
+                <a:solidFill>
+                  <a:srgbClr val="D4D4D4"/>
+                </a:solidFill>
+                <a:effectLst/>
+                <a:latin typeface="Menlo" panose="020B0609030804020204" pitchFamily="49" charset="0"/>
+              </a:rPr>
+              <a:t>the</a:t>
+            </a:r>
+            <a:r>
+              <a:rPr lang="de-AT" b="0" i="0" dirty="0">
+                <a:solidFill>
+                  <a:srgbClr val="D4D4D4"/>
+                </a:solidFill>
+                <a:effectLst/>
+                <a:latin typeface="Menlo" panose="020B0609030804020204" pitchFamily="49" charset="0"/>
+              </a:rPr>
+              <a:t>', 288309), ('</a:t>
+            </a:r>
+            <a:r>
+              <a:rPr lang="de-AT" b="0" i="0" dirty="0" err="1">
+                <a:solidFill>
+                  <a:srgbClr val="D4D4D4"/>
+                </a:solidFill>
+                <a:effectLst/>
+                <a:latin typeface="Menlo" panose="020B0609030804020204" pitchFamily="49" charset="0"/>
+              </a:rPr>
+              <a:t>you</a:t>
+            </a:r>
+            <a:r>
+              <a:rPr lang="de-AT" b="0" i="0" dirty="0">
+                <a:solidFill>
+                  <a:srgbClr val="D4D4D4"/>
+                </a:solidFill>
+                <a:effectLst/>
+                <a:latin typeface="Menlo" panose="020B0609030804020204" pitchFamily="49" charset="0"/>
+              </a:rPr>
+              <a:t>', 260889), ('</a:t>
+            </a:r>
+            <a:r>
+              <a:rPr lang="de-AT" b="0" i="0" dirty="0" err="1">
+                <a:solidFill>
+                  <a:srgbClr val="D4D4D4"/>
+                </a:solidFill>
+                <a:effectLst/>
+                <a:latin typeface="Menlo" panose="020B0609030804020204" pitchFamily="49" charset="0"/>
+              </a:rPr>
+              <a:t>to</a:t>
+            </a:r>
+            <a:r>
+              <a:rPr lang="de-AT" b="0" i="0" dirty="0">
+                <a:solidFill>
+                  <a:srgbClr val="D4D4D4"/>
+                </a:solidFill>
+                <a:effectLst/>
+                <a:latin typeface="Menlo" panose="020B0609030804020204" pitchFamily="49" charset="0"/>
+              </a:rPr>
+              <a:t>', 161731)] </a:t>
+            </a:r>
+          </a:p>
+          <a:p>
+            <a:pPr algn="l"/>
+            <a:r>
+              <a:rPr lang="de-AT" b="0" i="0" dirty="0" err="1">
+                <a:solidFill>
+                  <a:srgbClr val="D4D4D4"/>
+                </a:solidFill>
+                <a:effectLst/>
+                <a:latin typeface="Menlo" panose="020B0609030804020204" pitchFamily="49" charset="0"/>
+              </a:rPr>
+              <a:t>Filtered</a:t>
+            </a:r>
+            <a:r>
+              <a:rPr lang="de-AT" b="0" i="0" dirty="0">
+                <a:solidFill>
+                  <a:srgbClr val="D4D4D4"/>
+                </a:solidFill>
+                <a:effectLst/>
+                <a:latin typeface="Menlo" panose="020B0609030804020204" pitchFamily="49" charset="0"/>
+              </a:rPr>
+              <a:t> Words after </a:t>
+            </a:r>
+            <a:r>
+              <a:rPr lang="de-AT" b="0" i="0" dirty="0" err="1">
+                <a:solidFill>
+                  <a:srgbClr val="D4D4D4"/>
+                </a:solidFill>
+                <a:effectLst/>
+                <a:latin typeface="Menlo" panose="020B0609030804020204" pitchFamily="49" charset="0"/>
+              </a:rPr>
+              <a:t>Stopword</a:t>
+            </a:r>
+            <a:r>
+              <a:rPr lang="de-AT" b="0" i="0" dirty="0">
+                <a:solidFill>
+                  <a:srgbClr val="D4D4D4"/>
+                </a:solidFill>
+                <a:effectLst/>
+                <a:latin typeface="Menlo" panose="020B0609030804020204" pitchFamily="49" charset="0"/>
+              </a:rPr>
+              <a:t> </a:t>
+            </a:r>
+            <a:r>
+              <a:rPr lang="de-AT" b="0" i="0" dirty="0" err="1">
+                <a:solidFill>
+                  <a:srgbClr val="D4D4D4"/>
+                </a:solidFill>
+                <a:effectLst/>
+                <a:latin typeface="Menlo" panose="020B0609030804020204" pitchFamily="49" charset="0"/>
+              </a:rPr>
+              <a:t>Removal</a:t>
+            </a:r>
+            <a:r>
+              <a:rPr lang="de-AT" b="0" i="0" dirty="0">
+                <a:solidFill>
+                  <a:srgbClr val="D4D4D4"/>
+                </a:solidFill>
+                <a:effectLst/>
+                <a:latin typeface="Menlo" panose="020B0609030804020204" pitchFamily="49" charset="0"/>
+              </a:rPr>
+              <a:t>: 5675367 </a:t>
+            </a:r>
+            <a:r>
+              <a:rPr lang="de-AT" b="0" i="0" dirty="0" err="1">
+                <a:solidFill>
+                  <a:srgbClr val="D4D4D4"/>
+                </a:solidFill>
+                <a:effectLst/>
+                <a:latin typeface="Menlo" panose="020B0609030804020204" pitchFamily="49" charset="0"/>
+              </a:rPr>
+              <a:t>words</a:t>
+            </a:r>
+            <a:endParaRPr lang="de-AT" dirty="0">
+              <a:solidFill>
+                <a:schemeClr val="bg1"/>
+              </a:solidFill>
+              <a:latin typeface="Söhne"/>
             </a:endParaRPr>
           </a:p>
         </p:txBody>
@@ -13989,40 +15480,10 @@
           </p:txBody>
         </p:sp>
       </p:grpSp>
-      <p:pic>
-        <p:nvPicPr>
-          <p:cNvPr id="2" name="Grafik 1">
-            <a:extLst>
-              <a:ext uri="{FF2B5EF4-FFF2-40B4-BE49-F238E27FC236}">
-                <a16:creationId xmlns:a16="http://schemas.microsoft.com/office/drawing/2014/main" id="{9EB3951C-2213-28B1-AA9F-39D3DCACF726}"/>
-              </a:ext>
-            </a:extLst>
-          </p:cNvPr>
-          <p:cNvPicPr>
-            <a:picLocks noChangeAspect="1"/>
-          </p:cNvPicPr>
-          <p:nvPr/>
-        </p:nvPicPr>
-        <p:blipFill>
-          <a:blip r:embed="rId3"/>
-          <a:stretch>
-            <a:fillRect/>
-          </a:stretch>
-        </p:blipFill>
-        <p:spPr>
-          <a:xfrm>
-            <a:off x="4690673" y="1619154"/>
-            <a:ext cx="5895738" cy="4203314"/>
-          </a:xfrm>
-          <a:prstGeom prst="rect">
-            <a:avLst/>
-          </a:prstGeom>
-        </p:spPr>
-      </p:pic>
     </p:spTree>
     <p:extLst>
       <p:ext uri="{BB962C8B-B14F-4D97-AF65-F5344CB8AC3E}">
-        <p14:creationId xmlns:p14="http://schemas.microsoft.com/office/powerpoint/2010/main" val="1844234061"/>
+        <p14:creationId xmlns:p14="http://schemas.microsoft.com/office/powerpoint/2010/main" val="136629416"/>
       </p:ext>
     </p:extLst>
   </p:cSld>
@@ -14107,63 +15568,6 @@
       </p:sp>
       <p:sp>
         <p:nvSpPr>
-          <p:cNvPr id="42" name="Rectangle: Rounded Corners 41">
-            <a:extLst>
-              <a:ext uri="{FF2B5EF4-FFF2-40B4-BE49-F238E27FC236}">
-                <a16:creationId xmlns:a16="http://schemas.microsoft.com/office/drawing/2014/main" id="{2D323B2B-1A46-4DE2-23B4-AE05B947C523}"/>
-              </a:ext>
-            </a:extLst>
-          </p:cNvPr>
-          <p:cNvSpPr/>
-          <p:nvPr/>
-        </p:nvSpPr>
-        <p:spPr>
-          <a:xfrm>
-            <a:off x="3428683" y="1367642"/>
-            <a:ext cx="8382635" cy="4756908"/>
-          </a:xfrm>
-          <a:prstGeom prst="roundRect">
-            <a:avLst>
-              <a:gd name="adj" fmla="val 7408"/>
-            </a:avLst>
-          </a:prstGeom>
-          <a:solidFill>
-            <a:srgbClr val="0A0A0B"/>
-          </a:solidFill>
-          <a:ln>
-            <a:noFill/>
-          </a:ln>
-        </p:spPr>
-        <p:style>
-          <a:lnRef idx="2">
-            <a:schemeClr val="accent1">
-              <a:shade val="50000"/>
-            </a:schemeClr>
-          </a:lnRef>
-          <a:fillRef idx="1">
-            <a:schemeClr val="accent1"/>
-          </a:fillRef>
-          <a:effectRef idx="0">
-            <a:schemeClr val="accent1"/>
-          </a:effectRef>
-          <a:fontRef idx="minor">
-            <a:schemeClr val="lt1"/>
-          </a:fontRef>
-        </p:style>
-        <p:txBody>
-          <a:bodyPr rtlCol="0" anchor="ctr"/>
-          <a:lstStyle/>
-          <a:p>
-            <a:pPr algn="ctr"/>
-            <a:endParaRPr lang="en-US">
-              <a:latin typeface="Segoe UI" panose="020B0502040204020203" pitchFamily="34" charset="0"/>
-              <a:cs typeface="Segoe UI" panose="020B0502040204020203" pitchFamily="34" charset="0"/>
-            </a:endParaRPr>
-          </a:p>
-        </p:txBody>
-      </p:sp>
-      <p:sp>
-        <p:nvSpPr>
           <p:cNvPr id="45" name="TextBox 44">
             <a:extLst>
               <a:ext uri="{FF2B5EF4-FFF2-40B4-BE49-F238E27FC236}">
@@ -14196,174 +15600,6 @@
               </a:solidFill>
               <a:latin typeface="Segoe UI" panose="020B0502040204020203" pitchFamily="34" charset="0"/>
               <a:cs typeface="Segoe UI" panose="020B0502040204020203" pitchFamily="34" charset="0"/>
-            </a:endParaRPr>
-          </a:p>
-        </p:txBody>
-      </p:sp>
-      <p:sp>
-        <p:nvSpPr>
-          <p:cNvPr id="48" name="TextBox 47">
-            <a:extLst>
-              <a:ext uri="{FF2B5EF4-FFF2-40B4-BE49-F238E27FC236}">
-                <a16:creationId xmlns:a16="http://schemas.microsoft.com/office/drawing/2014/main" id="{E4CCABAB-F10A-642D-34EC-706C8A69764F}"/>
-              </a:ext>
-            </a:extLst>
-          </p:cNvPr>
-          <p:cNvSpPr txBox="1"/>
-          <p:nvPr/>
-        </p:nvSpPr>
-        <p:spPr>
-          <a:xfrm>
-            <a:off x="3666184" y="1569060"/>
-            <a:ext cx="7929163" cy="4431689"/>
-          </a:xfrm>
-          <a:prstGeom prst="rect">
-            <a:avLst/>
-          </a:prstGeom>
-          <a:noFill/>
-        </p:spPr>
-        <p:txBody>
-          <a:bodyPr wrap="square" lIns="0" rIns="0" rtlCol="0" anchor="t" anchorCtr="0">
-            <a:noAutofit/>
-          </a:bodyPr>
-          <a:lstStyle/>
-          <a:p>
-            <a:pPr algn="l"/>
-            <a:r>
-              <a:rPr lang="de-AT" sz="2800" dirty="0" err="1">
-                <a:solidFill>
-                  <a:schemeClr val="bg1"/>
-                </a:solidFill>
-                <a:latin typeface="Söhne"/>
-              </a:rPr>
-              <a:t>Statistics</a:t>
-            </a:r>
-            <a:r>
-              <a:rPr lang="de-AT" sz="2800" dirty="0">
-                <a:solidFill>
-                  <a:schemeClr val="bg1"/>
-                </a:solidFill>
-                <a:latin typeface="Söhne"/>
-              </a:rPr>
-              <a:t> </a:t>
-            </a:r>
-            <a:r>
-              <a:rPr lang="de-AT" sz="2800" dirty="0" err="1">
-                <a:solidFill>
-                  <a:schemeClr val="bg1"/>
-                </a:solidFill>
-                <a:latin typeface="Söhne"/>
-              </a:rPr>
-              <a:t>for</a:t>
-            </a:r>
-            <a:r>
-              <a:rPr lang="de-AT" sz="2800" dirty="0">
-                <a:solidFill>
-                  <a:schemeClr val="bg1"/>
-                </a:solidFill>
-                <a:latin typeface="Söhne"/>
-              </a:rPr>
-              <a:t> </a:t>
-            </a:r>
-            <a:r>
-              <a:rPr lang="de-AT" sz="2800" dirty="0" err="1">
-                <a:solidFill>
-                  <a:schemeClr val="bg1"/>
-                </a:solidFill>
-                <a:latin typeface="Söhne"/>
-              </a:rPr>
-              <a:t>lyrics</a:t>
-            </a:r>
-            <a:r>
-              <a:rPr lang="de-AT" sz="2800" dirty="0">
-                <a:solidFill>
-                  <a:schemeClr val="bg1"/>
-                </a:solidFill>
-                <a:latin typeface="Söhne"/>
-              </a:rPr>
-              <a:t>:</a:t>
-            </a:r>
-          </a:p>
-          <a:p>
-            <a:pPr marL="457200" indent="-457200" algn="l">
-              <a:buFont typeface="Arial" panose="020B0604020202020204" pitchFamily="34" charset="0"/>
-              <a:buChar char="•"/>
-            </a:pPr>
-            <a:r>
-              <a:rPr lang="de-AT" sz="2800" dirty="0">
-                <a:solidFill>
-                  <a:schemeClr val="bg1"/>
-                </a:solidFill>
-                <a:latin typeface="Söhne"/>
-              </a:rPr>
-              <a:t>40.816 </a:t>
-            </a:r>
-            <a:r>
-              <a:rPr lang="de-AT" sz="2800" dirty="0" err="1">
-                <a:solidFill>
-                  <a:schemeClr val="bg1"/>
-                </a:solidFill>
-                <a:latin typeface="Söhne"/>
-              </a:rPr>
-              <a:t>unique</a:t>
-            </a:r>
-            <a:r>
-              <a:rPr lang="de-AT" sz="2800" dirty="0">
-                <a:solidFill>
-                  <a:schemeClr val="bg1"/>
-                </a:solidFill>
-                <a:latin typeface="Söhne"/>
-              </a:rPr>
-              <a:t> </a:t>
-            </a:r>
-            <a:r>
-              <a:rPr lang="de-AT" sz="2800" dirty="0" err="1">
-                <a:solidFill>
-                  <a:schemeClr val="bg1"/>
-                </a:solidFill>
-                <a:latin typeface="Söhne"/>
-              </a:rPr>
-              <a:t>lyrics</a:t>
-            </a:r>
-            <a:endParaRPr lang="de-AT" sz="2800" b="0" i="0" u="none" strike="noStrike" dirty="0">
-              <a:solidFill>
-                <a:schemeClr val="bg1"/>
-              </a:solidFill>
-              <a:effectLst/>
-              <a:latin typeface="Söhne"/>
-            </a:endParaRPr>
-          </a:p>
-          <a:p>
-            <a:pPr marL="457200" indent="-457200" algn="l">
-              <a:buFont typeface="Arial" panose="020B0604020202020204" pitchFamily="34" charset="0"/>
-              <a:buChar char="•"/>
-            </a:pPr>
-            <a:r>
-              <a:rPr lang="de-AT" sz="2800" b="0" i="0" u="none" strike="noStrike" dirty="0">
-                <a:solidFill>
-                  <a:schemeClr val="bg1"/>
-                </a:solidFill>
-                <a:effectLst/>
-                <a:latin typeface="Söhne"/>
-              </a:rPr>
-              <a:t>Different </a:t>
-            </a:r>
-            <a:r>
-              <a:rPr lang="de-AT" sz="2800" b="0" i="0" u="none" strike="noStrike" dirty="0" err="1">
-                <a:solidFill>
-                  <a:schemeClr val="bg1"/>
-                </a:solidFill>
-                <a:effectLst/>
-                <a:latin typeface="Söhne"/>
-              </a:rPr>
-              <a:t>languages</a:t>
-            </a:r>
-            <a:endParaRPr lang="de-AT" sz="2800" b="0" i="0" u="none" strike="noStrike" dirty="0">
-              <a:solidFill>
-                <a:schemeClr val="bg1"/>
-              </a:solidFill>
-              <a:effectLst/>
-              <a:latin typeface="Söhne"/>
             </a:endParaRPr>
           </a:p>
         </p:txBody>
@@ -15293,10 +16529,10 @@
       </p:grpSp>
       <p:pic>
         <p:nvPicPr>
-          <p:cNvPr id="2" name="Grafik 1">
+          <p:cNvPr id="4" name="Grafik 3">
             <a:extLst>
               <a:ext uri="{FF2B5EF4-FFF2-40B4-BE49-F238E27FC236}">
-                <a16:creationId xmlns:a16="http://schemas.microsoft.com/office/drawing/2014/main" id="{3E8219EA-2CAC-4B0B-27E4-4985CC7BE36F}"/>
+                <a16:creationId xmlns:a16="http://schemas.microsoft.com/office/drawing/2014/main" id="{E3DE8C02-123E-B00B-695B-810CAE17C9D3}"/>
               </a:ext>
             </a:extLst>
           </p:cNvPr>
@@ -15313,8 +16549,8 @@
         </p:blipFill>
         <p:spPr>
           <a:xfrm>
-            <a:off x="4094205" y="2925811"/>
-            <a:ext cx="1143000" cy="2247900"/>
+            <a:off x="3474402" y="1285934"/>
+            <a:ext cx="7772400" cy="5001767"/>
           </a:xfrm>
           <a:prstGeom prst="rect">
             <a:avLst/>
@@ -15324,7 +16560,7 @@
     </p:spTree>
     <p:extLst>
       <p:ext uri="{BB962C8B-B14F-4D97-AF65-F5344CB8AC3E}">
-        <p14:creationId xmlns:p14="http://schemas.microsoft.com/office/powerpoint/2010/main" val="136629416"/>
+        <p14:creationId xmlns:p14="http://schemas.microsoft.com/office/powerpoint/2010/main" val="3763819030"/>
       </p:ext>
     </p:extLst>
   </p:cSld>
@@ -16370,10 +17606,10 @@
       </p:grpSp>
       <p:pic>
         <p:nvPicPr>
-          <p:cNvPr id="4" name="Grafik 3">
+          <p:cNvPr id="2" name="Grafik 1">
             <a:extLst>
               <a:ext uri="{FF2B5EF4-FFF2-40B4-BE49-F238E27FC236}">
-                <a16:creationId xmlns:a16="http://schemas.microsoft.com/office/drawing/2014/main" id="{E3DE8C02-123E-B00B-695B-810CAE17C9D3}"/>
+                <a16:creationId xmlns:a16="http://schemas.microsoft.com/office/drawing/2014/main" id="{0DA9E9D1-6813-3982-91ED-4EEC4DE4EA1E}"/>
               </a:ext>
             </a:extLst>
           </p:cNvPr>
@@ -16390,8 +17626,8 @@
         </p:blipFill>
         <p:spPr>
           <a:xfrm>
-            <a:off x="3474402" y="1285934"/>
-            <a:ext cx="7772400" cy="5001767"/>
+            <a:off x="3474402" y="1157721"/>
+            <a:ext cx="7294258" cy="5152453"/>
           </a:xfrm>
           <a:prstGeom prst="rect">
             <a:avLst/>
@@ -16401,7 +17637,7 @@
     </p:spTree>
     <p:extLst>
       <p:ext uri="{BB962C8B-B14F-4D97-AF65-F5344CB8AC3E}">
-        <p14:creationId xmlns:p14="http://schemas.microsoft.com/office/powerpoint/2010/main" val="3763819030"/>
+        <p14:creationId xmlns:p14="http://schemas.microsoft.com/office/powerpoint/2010/main" val="3490447661"/>
       </p:ext>
     </p:extLst>
   </p:cSld>

</xml_diff>